<commit_message>
Chapter 3 - Start
</commit_message>
<xml_diff>
--- a/Praca/PrezentacjaZawierajacaObrazyPracy.pptx
+++ b/Praca/PrezentacjaZawierajacaObrazyPracy.pptx
@@ -369,7 +369,7 @@
     </p:spTree>
     <p:extLst>
       <p:ext uri="{BB962C8B-B14F-4D97-AF65-F5344CB8AC3E}">
-        <p14:creationId xmlns:p14="http://schemas.microsoft.com/office/powerpoint/2010/main" xmlns="" val="4140445158"/>
+        <p14:creationId xmlns:p14="http://schemas.microsoft.com/office/powerpoint/2010/main" val="4140445158"/>
       </p:ext>
     </p:extLst>
   </p:cSld>
@@ -4265,7 +4265,7 @@
             <a:blip r:embed="rId2">
               <a:extLst>
                 <a:ext uri="{28A0092B-C50C-407E-A947-70E740481C1C}">
-                  <a14:useLocalDpi xmlns:a14="http://schemas.microsoft.com/office/drawing/2010/main" xmlns="" val="0"/>
+                  <a14:useLocalDpi xmlns:a14="http://schemas.microsoft.com/office/drawing/2010/main" val="0"/>
                 </a:ext>
               </a:extLst>
             </a:blip>
@@ -4295,7 +4295,7 @@
             <a:blip r:embed="rId3">
               <a:extLst>
                 <a:ext uri="{28A0092B-C50C-407E-A947-70E740481C1C}">
-                  <a14:useLocalDpi xmlns:a14="http://schemas.microsoft.com/office/drawing/2010/main" xmlns="" val="0"/>
+                  <a14:useLocalDpi xmlns:a14="http://schemas.microsoft.com/office/drawing/2010/main" val="0"/>
                 </a:ext>
               </a:extLst>
             </a:blip>
@@ -7465,7 +7465,7 @@
     </p:spTree>
     <p:extLst>
       <p:ext uri="{BB962C8B-B14F-4D97-AF65-F5344CB8AC3E}">
-        <p14:creationId xmlns:p14="http://schemas.microsoft.com/office/powerpoint/2010/main" xmlns="" val="1324388323"/>
+        <p14:creationId xmlns:p14="http://schemas.microsoft.com/office/powerpoint/2010/main" val="1324388323"/>
       </p:ext>
     </p:extLst>
   </p:cSld>
@@ -30509,7 +30509,7 @@
     </p:spTree>
     <p:extLst>
       <p:ext uri="{BB962C8B-B14F-4D97-AF65-F5344CB8AC3E}">
-        <p14:creationId xmlns:p14="http://schemas.microsoft.com/office/powerpoint/2010/main" xmlns="" val="1888592034"/>
+        <p14:creationId xmlns:p14="http://schemas.microsoft.com/office/powerpoint/2010/main" val="1888592034"/>
       </p:ext>
     </p:extLst>
   </p:cSld>
@@ -32482,258 +32482,919 @@
           <a:chExt cx="0" cy="0"/>
         </a:xfrm>
       </p:grpSpPr>
-      <p:sp>
-        <p:nvSpPr>
-          <p:cNvPr id="4" name="Freeform 3"/>
-          <p:cNvSpPr/>
+      <p:grpSp>
+        <p:nvGrpSpPr>
+          <p:cNvPr id="49" name="Group 48"/>
+          <p:cNvGrpSpPr/>
           <p:nvPr/>
-        </p:nvSpPr>
-        <p:spPr>
+        </p:nvGrpSpPr>
+        <p:grpSpPr>
           <a:xfrm>
-            <a:off x="1143000" y="1219200"/>
-            <a:ext cx="1169670" cy="2308860"/>
+            <a:off x="606135" y="435530"/>
+            <a:ext cx="8405810" cy="5910828"/>
+            <a:chOff x="606135" y="435530"/>
+            <a:chExt cx="8405810" cy="5910828"/>
           </a:xfrm>
-          <a:custGeom>
-            <a:avLst/>
-            <a:gdLst>
-              <a:gd name="connsiteX0" fmla="*/ 293370 w 1169670"/>
-              <a:gd name="connsiteY0" fmla="*/ 0 h 2308860"/>
-              <a:gd name="connsiteX1" fmla="*/ 590550 w 1169670"/>
-              <a:gd name="connsiteY1" fmla="*/ 251460 h 2308860"/>
-              <a:gd name="connsiteX2" fmla="*/ 643890 w 1169670"/>
-              <a:gd name="connsiteY2" fmla="*/ 693420 h 2308860"/>
-              <a:gd name="connsiteX3" fmla="*/ 148590 w 1169670"/>
-              <a:gd name="connsiteY3" fmla="*/ 1234440 h 2308860"/>
-              <a:gd name="connsiteX4" fmla="*/ 11430 w 1169670"/>
-              <a:gd name="connsiteY4" fmla="*/ 1714500 h 2308860"/>
-              <a:gd name="connsiteX5" fmla="*/ 217170 w 1169670"/>
-              <a:gd name="connsiteY5" fmla="*/ 1981200 h 2308860"/>
-              <a:gd name="connsiteX6" fmla="*/ 849630 w 1169670"/>
-              <a:gd name="connsiteY6" fmla="*/ 1866900 h 2308860"/>
-              <a:gd name="connsiteX7" fmla="*/ 1169670 w 1169670"/>
-              <a:gd name="connsiteY7" fmla="*/ 2308860 h 2308860"/>
-            </a:gdLst>
-            <a:ahLst/>
-            <a:cxnLst>
-              <a:cxn ang="0">
-                <a:pos x="connsiteX0" y="connsiteY0"/>
-              </a:cxn>
-              <a:cxn ang="0">
-                <a:pos x="connsiteX1" y="connsiteY1"/>
-              </a:cxn>
-              <a:cxn ang="0">
-                <a:pos x="connsiteX2" y="connsiteY2"/>
-              </a:cxn>
-              <a:cxn ang="0">
-                <a:pos x="connsiteX3" y="connsiteY3"/>
-              </a:cxn>
-              <a:cxn ang="0">
-                <a:pos x="connsiteX4" y="connsiteY4"/>
-              </a:cxn>
-              <a:cxn ang="0">
-                <a:pos x="connsiteX5" y="connsiteY5"/>
-              </a:cxn>
-              <a:cxn ang="0">
-                <a:pos x="connsiteX6" y="connsiteY6"/>
-              </a:cxn>
-              <a:cxn ang="0">
-                <a:pos x="connsiteX7" y="connsiteY7"/>
-              </a:cxn>
-            </a:cxnLst>
-            <a:rect l="l" t="t" r="r" b="b"/>
-            <a:pathLst>
-              <a:path w="1169670" h="2308860">
-                <a:moveTo>
-                  <a:pt x="293370" y="0"/>
-                </a:moveTo>
-                <a:cubicBezTo>
-                  <a:pt x="412750" y="67945"/>
-                  <a:pt x="532130" y="135890"/>
-                  <a:pt x="590550" y="251460"/>
-                </a:cubicBezTo>
-                <a:cubicBezTo>
-                  <a:pt x="648970" y="367030"/>
-                  <a:pt x="717550" y="529590"/>
-                  <a:pt x="643890" y="693420"/>
-                </a:cubicBezTo>
-                <a:cubicBezTo>
-                  <a:pt x="570230" y="857250"/>
-                  <a:pt x="254000" y="1064260"/>
-                  <a:pt x="148590" y="1234440"/>
-                </a:cubicBezTo>
-                <a:cubicBezTo>
-                  <a:pt x="43180" y="1404620"/>
-                  <a:pt x="0" y="1590040"/>
-                  <a:pt x="11430" y="1714500"/>
-                </a:cubicBezTo>
-                <a:cubicBezTo>
-                  <a:pt x="22860" y="1838960"/>
-                  <a:pt x="77470" y="1955800"/>
-                  <a:pt x="217170" y="1981200"/>
-                </a:cubicBezTo>
-                <a:cubicBezTo>
-                  <a:pt x="356870" y="2006600"/>
-                  <a:pt x="690880" y="1812290"/>
-                  <a:pt x="849630" y="1866900"/>
-                </a:cubicBezTo>
-                <a:cubicBezTo>
-                  <a:pt x="1008380" y="1921510"/>
-                  <a:pt x="1089025" y="2115185"/>
-                  <a:pt x="1169670" y="2308860"/>
-                </a:cubicBezTo>
-              </a:path>
-            </a:pathLst>
-          </a:custGeom>
-        </p:spPr>
-        <p:style>
-          <a:lnRef idx="1">
-            <a:schemeClr val="accent1"/>
-          </a:lnRef>
-          <a:fillRef idx="0">
-            <a:schemeClr val="accent1"/>
-          </a:fillRef>
-          <a:effectRef idx="0">
-            <a:schemeClr val="accent1"/>
-          </a:effectRef>
-          <a:fontRef idx="minor">
-            <a:schemeClr val="tx1"/>
-          </a:fontRef>
-        </p:style>
-        <p:txBody>
-          <a:bodyPr rtlCol="0" anchor="ctr"/>
-          <a:lstStyle/>
-          <a:p>
-            <a:pPr algn="ctr"/>
-            <a:endParaRPr lang="en-US"/>
-          </a:p>
-        </p:txBody>
-      </p:sp>
-      <p:sp>
-        <p:nvSpPr>
-          <p:cNvPr id="6" name="Freeform 5"/>
-          <p:cNvSpPr/>
-          <p:nvPr/>
-        </p:nvSpPr>
-        <p:spPr>
-          <a:xfrm>
-            <a:off x="2362200" y="1219200"/>
-            <a:ext cx="1169670" cy="2308860"/>
-          </a:xfrm>
-          <a:custGeom>
-            <a:avLst/>
-            <a:gdLst>
-              <a:gd name="connsiteX0" fmla="*/ 293370 w 1169670"/>
-              <a:gd name="connsiteY0" fmla="*/ 0 h 2308860"/>
-              <a:gd name="connsiteX1" fmla="*/ 590550 w 1169670"/>
-              <a:gd name="connsiteY1" fmla="*/ 251460 h 2308860"/>
-              <a:gd name="connsiteX2" fmla="*/ 643890 w 1169670"/>
-              <a:gd name="connsiteY2" fmla="*/ 693420 h 2308860"/>
-              <a:gd name="connsiteX3" fmla="*/ 148590 w 1169670"/>
-              <a:gd name="connsiteY3" fmla="*/ 1234440 h 2308860"/>
-              <a:gd name="connsiteX4" fmla="*/ 11430 w 1169670"/>
-              <a:gd name="connsiteY4" fmla="*/ 1714500 h 2308860"/>
-              <a:gd name="connsiteX5" fmla="*/ 217170 w 1169670"/>
-              <a:gd name="connsiteY5" fmla="*/ 1981200 h 2308860"/>
-              <a:gd name="connsiteX6" fmla="*/ 849630 w 1169670"/>
-              <a:gd name="connsiteY6" fmla="*/ 1866900 h 2308860"/>
-              <a:gd name="connsiteX7" fmla="*/ 1169670 w 1169670"/>
-              <a:gd name="connsiteY7" fmla="*/ 2308860 h 2308860"/>
-            </a:gdLst>
-            <a:ahLst/>
-            <a:cxnLst>
-              <a:cxn ang="0">
-                <a:pos x="connsiteX0" y="connsiteY0"/>
-              </a:cxn>
-              <a:cxn ang="0">
-                <a:pos x="connsiteX1" y="connsiteY1"/>
-              </a:cxn>
-              <a:cxn ang="0">
-                <a:pos x="connsiteX2" y="connsiteY2"/>
-              </a:cxn>
-              <a:cxn ang="0">
-                <a:pos x="connsiteX3" y="connsiteY3"/>
-              </a:cxn>
-              <a:cxn ang="0">
-                <a:pos x="connsiteX4" y="connsiteY4"/>
-              </a:cxn>
-              <a:cxn ang="0">
-                <a:pos x="connsiteX5" y="connsiteY5"/>
-              </a:cxn>
-              <a:cxn ang="0">
-                <a:pos x="connsiteX6" y="connsiteY6"/>
-              </a:cxn>
-              <a:cxn ang="0">
-                <a:pos x="connsiteX7" y="connsiteY7"/>
-              </a:cxn>
-            </a:cxnLst>
-            <a:rect l="l" t="t" r="r" b="b"/>
-            <a:pathLst>
-              <a:path w="1169670" h="2308860">
-                <a:moveTo>
-                  <a:pt x="293370" y="0"/>
-                </a:moveTo>
-                <a:cubicBezTo>
-                  <a:pt x="412750" y="67945"/>
-                  <a:pt x="532130" y="135890"/>
-                  <a:pt x="590550" y="251460"/>
-                </a:cubicBezTo>
-                <a:cubicBezTo>
-                  <a:pt x="648970" y="367030"/>
-                  <a:pt x="717550" y="529590"/>
-                  <a:pt x="643890" y="693420"/>
-                </a:cubicBezTo>
-                <a:cubicBezTo>
-                  <a:pt x="570230" y="857250"/>
-                  <a:pt x="254000" y="1064260"/>
-                  <a:pt x="148590" y="1234440"/>
-                </a:cubicBezTo>
-                <a:cubicBezTo>
-                  <a:pt x="43180" y="1404620"/>
-                  <a:pt x="0" y="1590040"/>
-                  <a:pt x="11430" y="1714500"/>
-                </a:cubicBezTo>
-                <a:cubicBezTo>
-                  <a:pt x="22860" y="1838960"/>
-                  <a:pt x="77470" y="1955800"/>
-                  <a:pt x="217170" y="1981200"/>
-                </a:cubicBezTo>
-                <a:cubicBezTo>
-                  <a:pt x="356870" y="2006600"/>
-                  <a:pt x="690880" y="1812290"/>
-                  <a:pt x="849630" y="1866900"/>
-                </a:cubicBezTo>
-                <a:cubicBezTo>
-                  <a:pt x="1008380" y="1921510"/>
-                  <a:pt x="1089025" y="2115185"/>
-                  <a:pt x="1169670" y="2308860"/>
-                </a:cubicBezTo>
-              </a:path>
-            </a:pathLst>
-          </a:custGeom>
-        </p:spPr>
-        <p:style>
-          <a:lnRef idx="1">
-            <a:schemeClr val="accent1"/>
-          </a:lnRef>
-          <a:fillRef idx="0">
-            <a:schemeClr val="accent1"/>
-          </a:fillRef>
-          <a:effectRef idx="0">
-            <a:schemeClr val="accent1"/>
-          </a:effectRef>
-          <a:fontRef idx="minor">
-            <a:schemeClr val="tx1"/>
-          </a:fontRef>
-        </p:style>
-        <p:txBody>
-          <a:bodyPr rtlCol="0" anchor="ctr"/>
-          <a:lstStyle/>
-          <a:p>
-            <a:pPr algn="ctr"/>
-            <a:endParaRPr lang="en-US"/>
-          </a:p>
-        </p:txBody>
-      </p:sp>
+        </p:grpSpPr>
+        <p:grpSp>
+          <p:nvGrpSpPr>
+            <p:cNvPr id="48" name="Group 47"/>
+            <p:cNvGrpSpPr/>
+            <p:nvPr/>
+          </p:nvGrpSpPr>
+          <p:grpSpPr>
+            <a:xfrm>
+              <a:off x="606135" y="435530"/>
+              <a:ext cx="8405810" cy="5910828"/>
+              <a:chOff x="228601" y="506879"/>
+              <a:chExt cx="8405810" cy="5910828"/>
+            </a:xfrm>
+          </p:grpSpPr>
+          <p:pic>
+            <p:nvPicPr>
+              <p:cNvPr id="1026" name="Picture 2" descr="https://lh4.googleusercontent.com/thw97p5Ug0NfrwjGcjUYYPRLyohXD-4bI3LFHF4osR6u-_Rk9_qPWoia8b1bFfO_xJxFtmAoHWHOY7mAwKvS-QEygwxMUCn2SCvVyS-seaIwv9YcKIZJ7ls8AyCxvNlNcWs5tcfgyG4"/>
+              <p:cNvPicPr>
+                <a:picLocks noChangeAspect="1" noChangeArrowheads="1"/>
+              </p:cNvPicPr>
+              <p:nvPr/>
+            </p:nvPicPr>
+            <p:blipFill>
+              <a:blip r:embed="rId2">
+                <a:extLst>
+                  <a:ext uri="{28A0092B-C50C-407E-A947-70E740481C1C}">
+                    <a14:useLocalDpi xmlns:a14="http://schemas.microsoft.com/office/drawing/2010/main" val="0"/>
+                  </a:ext>
+                </a:extLst>
+              </a:blip>
+              <a:srcRect/>
+              <a:stretch>
+                <a:fillRect/>
+              </a:stretch>
+            </p:blipFill>
+            <p:spPr bwMode="auto">
+              <a:xfrm>
+                <a:off x="228601" y="1014414"/>
+                <a:ext cx="2345742" cy="1228722"/>
+              </a:xfrm>
+              <a:prstGeom prst="rect">
+                <a:avLst/>
+              </a:prstGeom>
+              <a:noFill/>
+              <a:ln w="28575">
+                <a:solidFill>
+                  <a:schemeClr val="tx1"/>
+                </a:solidFill>
+              </a:ln>
+              <a:extLst>
+                <a:ext uri="{909E8E84-426E-40DD-AFC4-6F175D3DCCD1}">
+                  <a14:hiddenFill xmlns:a14="http://schemas.microsoft.com/office/drawing/2010/main">
+                    <a:solidFill>
+                      <a:srgbClr val="FFFFFF"/>
+                    </a:solidFill>
+                  </a14:hiddenFill>
+                </a:ext>
+              </a:extLst>
+            </p:spPr>
+          </p:pic>
+          <p:pic>
+            <p:nvPicPr>
+              <p:cNvPr id="1028" name="Picture 4" descr="https://lh4.googleusercontent.com/yuP7qB2jaonIcZuDCrEWCPWehuf1TjhFqLPhCfVWMFr3PGtJlKwDHqb3Jr7UDjsCwHYMpgm5TLDLTaBHzDvvn9ApUAc7VxPkeXZ5O35KDlly6SD0ZZYMDlzXmWjSv9HlIkg5Dw8FNww"/>
+              <p:cNvPicPr>
+                <a:picLocks noChangeAspect="1" noChangeArrowheads="1"/>
+              </p:cNvPicPr>
+              <p:nvPr/>
+            </p:nvPicPr>
+            <p:blipFill>
+              <a:blip r:embed="rId3">
+                <a:extLst>
+                  <a:ext uri="{28A0092B-C50C-407E-A947-70E740481C1C}">
+                    <a14:useLocalDpi xmlns:a14="http://schemas.microsoft.com/office/drawing/2010/main" val="0"/>
+                  </a:ext>
+                </a:extLst>
+              </a:blip>
+              <a:srcRect/>
+              <a:stretch>
+                <a:fillRect/>
+              </a:stretch>
+            </p:blipFill>
+            <p:spPr bwMode="auto">
+              <a:xfrm>
+                <a:off x="3390900" y="1185862"/>
+                <a:ext cx="1638300" cy="885825"/>
+              </a:xfrm>
+              <a:prstGeom prst="rect">
+                <a:avLst/>
+              </a:prstGeom>
+              <a:noFill/>
+              <a:extLst>
+                <a:ext uri="{909E8E84-426E-40DD-AFC4-6F175D3DCCD1}">
+                  <a14:hiddenFill xmlns:a14="http://schemas.microsoft.com/office/drawing/2010/main">
+                    <a:solidFill>
+                      <a:srgbClr val="FFFFFF"/>
+                    </a:solidFill>
+                  </a14:hiddenFill>
+                </a:ext>
+              </a:extLst>
+            </p:spPr>
+          </p:pic>
+          <p:pic>
+            <p:nvPicPr>
+              <p:cNvPr id="1030" name="Picture 6" descr="https://lh3.googleusercontent.com/l1sp3Kh4QdqTJrJao38iQU5sCqKI9GK1vhMCzzwWczaLyq5-Tayif3ejPsfTEU0p3zbMq7mkR3Nd9LVARDVH6BFZgJ_MzOV43W80HKn9jVTCNdhY2fwV7pnKXHUvRB0oa91XZfuew1U"/>
+              <p:cNvPicPr>
+                <a:picLocks noChangeAspect="1" noChangeArrowheads="1"/>
+              </p:cNvPicPr>
+              <p:nvPr/>
+            </p:nvPicPr>
+            <p:blipFill>
+              <a:blip r:embed="rId4">
+                <a:extLst>
+                  <a:ext uri="{28A0092B-C50C-407E-A947-70E740481C1C}">
+                    <a14:useLocalDpi xmlns:a14="http://schemas.microsoft.com/office/drawing/2010/main" val="0"/>
+                  </a:ext>
+                </a:extLst>
+              </a:blip>
+              <a:srcRect/>
+              <a:stretch>
+                <a:fillRect/>
+              </a:stretch>
+            </p:blipFill>
+            <p:spPr bwMode="auto">
+              <a:xfrm>
+                <a:off x="5576886" y="1349803"/>
+                <a:ext cx="3057525" cy="557943"/>
+              </a:xfrm>
+              <a:prstGeom prst="rect">
+                <a:avLst/>
+              </a:prstGeom>
+              <a:ln>
+                <a:noFill/>
+              </a:ln>
+              <a:effectLst>
+                <a:softEdge rad="112500"/>
+              </a:effectLst>
+              <a:extLst>
+                <a:ext uri="{909E8E84-426E-40DD-AFC4-6F175D3DCCD1}">
+                  <a14:hiddenFill xmlns:a14="http://schemas.microsoft.com/office/drawing/2010/main">
+                    <a:solidFill>
+                      <a:srgbClr val="FFFFFF"/>
+                    </a:solidFill>
+                  </a14:hiddenFill>
+                </a:ext>
+              </a:extLst>
+            </p:spPr>
+          </p:pic>
+          <p:pic>
+            <p:nvPicPr>
+              <p:cNvPr id="1032" name="Picture 8" descr="https://lh6.googleusercontent.com/XsVZkuOrmoUCswyGlixwn3iDXqjClysyVIcfqiLW3Qz0YtLAzw-kEfYIeZRiDUFSBi0TGKMThumiEFkyoh__muRJD0YLKS2L_gW36JXrDNe-cZWURt6lmDZC0-ZEyLdX6gYwHGb66nU"/>
+              <p:cNvPicPr>
+                <a:picLocks noChangeAspect="1" noChangeArrowheads="1"/>
+              </p:cNvPicPr>
+              <p:nvPr/>
+            </p:nvPicPr>
+            <p:blipFill>
+              <a:blip r:embed="rId5" cstate="print">
+                <a:extLst>
+                  <a:ext uri="{28A0092B-C50C-407E-A947-70E740481C1C}">
+                    <a14:useLocalDpi xmlns:a14="http://schemas.microsoft.com/office/drawing/2010/main" val="0"/>
+                  </a:ext>
+                </a:extLst>
+              </a:blip>
+              <a:srcRect/>
+              <a:stretch>
+                <a:fillRect/>
+              </a:stretch>
+            </p:blipFill>
+            <p:spPr bwMode="auto">
+              <a:xfrm>
+                <a:off x="6343650" y="4524375"/>
+                <a:ext cx="1524000" cy="1524000"/>
+              </a:xfrm>
+              <a:prstGeom prst="rect">
+                <a:avLst/>
+              </a:prstGeom>
+              <a:noFill/>
+              <a:extLst>
+                <a:ext uri="{909E8E84-426E-40DD-AFC4-6F175D3DCCD1}">
+                  <a14:hiddenFill xmlns:a14="http://schemas.microsoft.com/office/drawing/2010/main">
+                    <a:solidFill>
+                      <a:srgbClr val="FFFFFF"/>
+                    </a:solidFill>
+                  </a14:hiddenFill>
+                </a:ext>
+              </a:extLst>
+            </p:spPr>
+          </p:pic>
+          <p:pic>
+            <p:nvPicPr>
+              <p:cNvPr id="1034" name="Picture 10" descr="https://lh3.googleusercontent.com/5KgD_GAL-CKO2Gp_HQOUbxOSgXr1eatRuUNb9BX4WMlGzAVOVrjIGX-cqAUglnHIRPSyNKfR4m8w-e6WHIDSyFttP5G67S9Fc9u6hYIQXwdyhrBs6C6KDm0F7xERRjfimbrBtc0jJ_0"/>
+              <p:cNvPicPr>
+                <a:picLocks noChangeAspect="1" noChangeArrowheads="1"/>
+              </p:cNvPicPr>
+              <p:nvPr/>
+            </p:nvPicPr>
+            <p:blipFill>
+              <a:blip r:embed="rId6">
+                <a:extLst>
+                  <a:ext uri="{28A0092B-C50C-407E-A947-70E740481C1C}">
+                    <a14:useLocalDpi xmlns:a14="http://schemas.microsoft.com/office/drawing/2010/main" val="0"/>
+                  </a:ext>
+                </a:extLst>
+              </a:blip>
+              <a:srcRect/>
+              <a:stretch>
+                <a:fillRect/>
+              </a:stretch>
+            </p:blipFill>
+            <p:spPr bwMode="auto">
+              <a:xfrm>
+                <a:off x="664652" y="4410075"/>
+                <a:ext cx="1473639" cy="1752600"/>
+              </a:xfrm>
+              <a:prstGeom prst="rect">
+                <a:avLst/>
+              </a:prstGeom>
+              <a:ln>
+                <a:noFill/>
+              </a:ln>
+              <a:effectLst>
+                <a:softEdge rad="112500"/>
+              </a:effectLst>
+              <a:extLst>
+                <a:ext uri="{909E8E84-426E-40DD-AFC4-6F175D3DCCD1}">
+                  <a14:hiddenFill xmlns:a14="http://schemas.microsoft.com/office/drawing/2010/main">
+                    <a:solidFill>
+                      <a:srgbClr val="FFFFFF"/>
+                    </a:solidFill>
+                  </a14:hiddenFill>
+                </a:ext>
+              </a:extLst>
+            </p:spPr>
+          </p:pic>
+          <p:cxnSp>
+            <p:nvCxnSpPr>
+              <p:cNvPr id="3" name="Straight Arrow Connector 2"/>
+              <p:cNvCxnSpPr>
+                <a:stCxn id="1026" idx="3"/>
+                <a:endCxn id="1028" idx="1"/>
+              </p:cNvCxnSpPr>
+              <p:nvPr/>
+            </p:nvCxnSpPr>
+            <p:spPr>
+              <a:xfrm>
+                <a:off x="2574343" y="1628775"/>
+                <a:ext cx="816557" cy="0"/>
+              </a:xfrm>
+              <a:prstGeom prst="straightConnector1">
+                <a:avLst/>
+              </a:prstGeom>
+              <a:ln w="38100">
+                <a:solidFill>
+                  <a:schemeClr val="tx2">
+                    <a:lumMod val="50000"/>
+                  </a:schemeClr>
+                </a:solidFill>
+                <a:tailEnd type="arrow"/>
+              </a:ln>
+            </p:spPr>
+            <p:style>
+              <a:lnRef idx="1">
+                <a:schemeClr val="accent1"/>
+              </a:lnRef>
+              <a:fillRef idx="0">
+                <a:schemeClr val="accent1"/>
+              </a:fillRef>
+              <a:effectRef idx="0">
+                <a:schemeClr val="accent1"/>
+              </a:effectRef>
+              <a:fontRef idx="minor">
+                <a:schemeClr val="tx1"/>
+              </a:fontRef>
+            </p:style>
+          </p:cxnSp>
+          <p:cxnSp>
+            <p:nvCxnSpPr>
+              <p:cNvPr id="10" name="Straight Arrow Connector 9"/>
+              <p:cNvCxnSpPr>
+                <a:stCxn id="1028" idx="3"/>
+                <a:endCxn id="1030" idx="1"/>
+              </p:cNvCxnSpPr>
+              <p:nvPr/>
+            </p:nvCxnSpPr>
+            <p:spPr>
+              <a:xfrm>
+                <a:off x="5029200" y="1628775"/>
+                <a:ext cx="547686" cy="0"/>
+              </a:xfrm>
+              <a:prstGeom prst="straightConnector1">
+                <a:avLst/>
+              </a:prstGeom>
+              <a:ln w="38100">
+                <a:solidFill>
+                  <a:schemeClr val="tx2">
+                    <a:lumMod val="50000"/>
+                  </a:schemeClr>
+                </a:solidFill>
+                <a:tailEnd type="arrow"/>
+              </a:ln>
+            </p:spPr>
+            <p:style>
+              <a:lnRef idx="1">
+                <a:schemeClr val="accent1"/>
+              </a:lnRef>
+              <a:fillRef idx="0">
+                <a:schemeClr val="accent1"/>
+              </a:fillRef>
+              <a:effectRef idx="0">
+                <a:schemeClr val="accent1"/>
+              </a:effectRef>
+              <a:fontRef idx="minor">
+                <a:schemeClr val="tx1"/>
+              </a:fontRef>
+            </p:style>
+          </p:cxnSp>
+          <p:cxnSp>
+            <p:nvCxnSpPr>
+              <p:cNvPr id="19" name="Straight Arrow Connector 18"/>
+              <p:cNvCxnSpPr>
+                <a:stCxn id="1030" idx="2"/>
+                <a:endCxn id="1032" idx="0"/>
+              </p:cNvCxnSpPr>
+              <p:nvPr/>
+            </p:nvCxnSpPr>
+            <p:spPr>
+              <a:xfrm>
+                <a:off x="7105649" y="1907746"/>
+                <a:ext cx="1" cy="2616629"/>
+              </a:xfrm>
+              <a:prstGeom prst="straightConnector1">
+                <a:avLst/>
+              </a:prstGeom>
+              <a:ln w="38100">
+                <a:solidFill>
+                  <a:schemeClr val="tx2">
+                    <a:lumMod val="50000"/>
+                  </a:schemeClr>
+                </a:solidFill>
+                <a:tailEnd type="arrow"/>
+              </a:ln>
+            </p:spPr>
+            <p:style>
+              <a:lnRef idx="1">
+                <a:schemeClr val="accent1"/>
+              </a:lnRef>
+              <a:fillRef idx="0">
+                <a:schemeClr val="accent1"/>
+              </a:fillRef>
+              <a:effectRef idx="0">
+                <a:schemeClr val="accent1"/>
+              </a:effectRef>
+              <a:fontRef idx="minor">
+                <a:schemeClr val="tx1"/>
+              </a:fontRef>
+            </p:style>
+          </p:cxnSp>
+          <p:sp>
+            <p:nvSpPr>
+              <p:cNvPr id="21" name="Rectangle 20"/>
+              <p:cNvSpPr/>
+              <p:nvPr/>
+            </p:nvSpPr>
+            <p:spPr>
+              <a:xfrm>
+                <a:off x="3200400" y="4933950"/>
+                <a:ext cx="1219200" cy="704850"/>
+              </a:xfrm>
+              <a:prstGeom prst="rect">
+                <a:avLst/>
+              </a:prstGeom>
+              <a:noFill/>
+              <a:ln>
+                <a:solidFill>
+                  <a:schemeClr val="bg1"/>
+                </a:solidFill>
+              </a:ln>
+            </p:spPr>
+            <p:style>
+              <a:lnRef idx="2">
+                <a:schemeClr val="accent1">
+                  <a:shade val="50000"/>
+                </a:schemeClr>
+              </a:lnRef>
+              <a:fillRef idx="1">
+                <a:schemeClr val="accent1"/>
+              </a:fillRef>
+              <a:effectRef idx="0">
+                <a:schemeClr val="accent1"/>
+              </a:effectRef>
+              <a:fontRef idx="minor">
+                <a:schemeClr val="lt1"/>
+              </a:fontRef>
+            </p:style>
+            <p:txBody>
+              <a:bodyPr rtlCol="0" anchor="ctr"/>
+              <a:lstStyle/>
+              <a:p>
+                <a:pPr algn="ctr"/>
+                <a:r>
+                  <a:rPr lang="pl-PL" sz="2800" b="1" dirty="0" smtClean="0">
+                    <a:ln>
+                      <a:solidFill>
+                        <a:schemeClr val="tx1"/>
+                      </a:solidFill>
+                    </a:ln>
+                    <a:solidFill>
+                      <a:schemeClr val="tx1">
+                        <a:lumMod val="95000"/>
+                        <a:lumOff val="5000"/>
+                      </a:schemeClr>
+                    </a:solidFill>
+                  </a:rPr>
+                  <a:t>SVM</a:t>
+                </a:r>
+                <a:endParaRPr lang="pl-PL" b="1" dirty="0">
+                  <a:ln>
+                    <a:solidFill>
+                      <a:schemeClr val="tx1"/>
+                    </a:solidFill>
+                  </a:ln>
+                  <a:solidFill>
+                    <a:schemeClr val="tx1">
+                      <a:lumMod val="95000"/>
+                      <a:lumOff val="5000"/>
+                    </a:schemeClr>
+                  </a:solidFill>
+                </a:endParaRPr>
+              </a:p>
+            </p:txBody>
+          </p:sp>
+          <p:cxnSp>
+            <p:nvCxnSpPr>
+              <p:cNvPr id="23" name="Straight Arrow Connector 22"/>
+              <p:cNvCxnSpPr>
+                <a:stCxn id="1032" idx="1"/>
+                <a:endCxn id="21" idx="3"/>
+              </p:cNvCxnSpPr>
+              <p:nvPr/>
+            </p:nvCxnSpPr>
+            <p:spPr>
+              <a:xfrm flipH="1">
+                <a:off x="4419600" y="5286375"/>
+                <a:ext cx="1924050" cy="0"/>
+              </a:xfrm>
+              <a:prstGeom prst="straightConnector1">
+                <a:avLst/>
+              </a:prstGeom>
+              <a:ln w="38100">
+                <a:solidFill>
+                  <a:schemeClr val="tx2">
+                    <a:lumMod val="50000"/>
+                  </a:schemeClr>
+                </a:solidFill>
+                <a:tailEnd type="arrow"/>
+              </a:ln>
+            </p:spPr>
+            <p:style>
+              <a:lnRef idx="1">
+                <a:schemeClr val="accent1"/>
+              </a:lnRef>
+              <a:fillRef idx="0">
+                <a:schemeClr val="accent1"/>
+              </a:fillRef>
+              <a:effectRef idx="0">
+                <a:schemeClr val="accent1"/>
+              </a:effectRef>
+              <a:fontRef idx="minor">
+                <a:schemeClr val="tx1"/>
+              </a:fontRef>
+            </p:style>
+          </p:cxnSp>
+          <p:cxnSp>
+            <p:nvCxnSpPr>
+              <p:cNvPr id="25" name="Straight Arrow Connector 24"/>
+              <p:cNvCxnSpPr>
+                <a:stCxn id="1034" idx="3"/>
+                <a:endCxn id="21" idx="1"/>
+              </p:cNvCxnSpPr>
+              <p:nvPr/>
+            </p:nvCxnSpPr>
+            <p:spPr>
+              <a:xfrm>
+                <a:off x="2138291" y="5286375"/>
+                <a:ext cx="1062109" cy="0"/>
+              </a:xfrm>
+              <a:prstGeom prst="straightConnector1">
+                <a:avLst/>
+              </a:prstGeom>
+              <a:ln w="38100">
+                <a:solidFill>
+                  <a:schemeClr val="tx2">
+                    <a:lumMod val="50000"/>
+                  </a:schemeClr>
+                </a:solidFill>
+                <a:tailEnd type="arrow"/>
+              </a:ln>
+            </p:spPr>
+            <p:style>
+              <a:lnRef idx="1">
+                <a:schemeClr val="accent1"/>
+              </a:lnRef>
+              <a:fillRef idx="0">
+                <a:schemeClr val="accent1"/>
+              </a:fillRef>
+              <a:effectRef idx="0">
+                <a:schemeClr val="accent1"/>
+              </a:effectRef>
+              <a:fontRef idx="minor">
+                <a:schemeClr val="tx1"/>
+              </a:fontRef>
+            </p:style>
+          </p:cxnSp>
+          <p:sp>
+            <p:nvSpPr>
+              <p:cNvPr id="31" name="Rectangle 30"/>
+              <p:cNvSpPr/>
+              <p:nvPr/>
+            </p:nvSpPr>
+            <p:spPr>
+              <a:xfrm>
+                <a:off x="3081337" y="2971800"/>
+                <a:ext cx="1457325" cy="914400"/>
+              </a:xfrm>
+              <a:prstGeom prst="rect">
+                <a:avLst/>
+              </a:prstGeom>
+              <a:noFill/>
+              <a:ln>
+                <a:solidFill>
+                  <a:schemeClr val="bg1"/>
+                </a:solidFill>
+              </a:ln>
+            </p:spPr>
+            <p:style>
+              <a:lnRef idx="2">
+                <a:schemeClr val="accent1">
+                  <a:shade val="50000"/>
+                </a:schemeClr>
+              </a:lnRef>
+              <a:fillRef idx="1">
+                <a:schemeClr val="accent1"/>
+              </a:fillRef>
+              <a:effectRef idx="0">
+                <a:schemeClr val="accent1"/>
+              </a:effectRef>
+              <a:fontRef idx="minor">
+                <a:schemeClr val="lt1"/>
+              </a:fontRef>
+            </p:style>
+            <p:txBody>
+              <a:bodyPr rtlCol="0" anchor="ctr"/>
+              <a:lstStyle/>
+              <a:p>
+                <a:pPr algn="ctr"/>
+                <a:r>
+                  <a:rPr lang="pl-PL" sz="4800" b="1" dirty="0" smtClean="0">
+                    <a:ln>
+                      <a:solidFill>
+                        <a:schemeClr val="tx1"/>
+                      </a:solidFill>
+                    </a:ln>
+                    <a:solidFill>
+                      <a:srgbClr val="FF0000"/>
+                    </a:solidFill>
+                  </a:rPr>
+                  <a:t>TRZY</a:t>
+                </a:r>
+                <a:endParaRPr lang="pl-PL" b="1" dirty="0">
+                  <a:ln>
+                    <a:solidFill>
+                      <a:schemeClr val="tx1"/>
+                    </a:solidFill>
+                  </a:ln>
+                  <a:solidFill>
+                    <a:srgbClr val="FF0000"/>
+                  </a:solidFill>
+                </a:endParaRPr>
+              </a:p>
+            </p:txBody>
+          </p:sp>
+          <p:cxnSp>
+            <p:nvCxnSpPr>
+              <p:cNvPr id="27" name="Straight Arrow Connector 26"/>
+              <p:cNvCxnSpPr>
+                <a:stCxn id="21" idx="0"/>
+                <a:endCxn id="31" idx="2"/>
+              </p:cNvCxnSpPr>
+              <p:nvPr/>
+            </p:nvCxnSpPr>
+            <p:spPr>
+              <a:xfrm flipV="1">
+                <a:off x="3810000" y="3886200"/>
+                <a:ext cx="0" cy="1047750"/>
+              </a:xfrm>
+              <a:prstGeom prst="straightConnector1">
+                <a:avLst/>
+              </a:prstGeom>
+              <a:ln w="38100">
+                <a:solidFill>
+                  <a:schemeClr val="tx2">
+                    <a:lumMod val="50000"/>
+                  </a:schemeClr>
+                </a:solidFill>
+                <a:tailEnd type="arrow"/>
+              </a:ln>
+            </p:spPr>
+            <p:style>
+              <a:lnRef idx="1">
+                <a:schemeClr val="accent1"/>
+              </a:lnRef>
+              <a:fillRef idx="0">
+                <a:schemeClr val="accent1"/>
+              </a:fillRef>
+              <a:effectRef idx="0">
+                <a:schemeClr val="accent1"/>
+              </a:effectRef>
+              <a:fontRef idx="minor">
+                <a:schemeClr val="tx1"/>
+              </a:fontRef>
+            </p:style>
+          </p:cxnSp>
+          <p:sp>
+            <p:nvSpPr>
+              <p:cNvPr id="46" name="TextBox 45"/>
+              <p:cNvSpPr txBox="1"/>
+              <p:nvPr/>
+            </p:nvSpPr>
+            <p:spPr>
+              <a:xfrm>
+                <a:off x="2312157" y="4800600"/>
+                <a:ext cx="714375" cy="369332"/>
+              </a:xfrm>
+              <a:prstGeom prst="rect">
+                <a:avLst/>
+              </a:prstGeom>
+              <a:noFill/>
+            </p:spPr>
+            <p:txBody>
+              <a:bodyPr wrap="square" rtlCol="0">
+                <a:spAutoFit/>
+              </a:bodyPr>
+              <a:lstStyle/>
+              <a:p>
+                <a:pPr algn="ctr"/>
+                <a:r>
+                  <a:rPr lang="pl-PL" b="1" dirty="0" smtClean="0"/>
+                  <a:t>SURF</a:t>
+                </a:r>
+                <a:endParaRPr lang="pl-PL" b="1" dirty="0"/>
+              </a:p>
+            </p:txBody>
+          </p:sp>
+          <p:sp>
+            <p:nvSpPr>
+              <p:cNvPr id="52" name="TextBox 51"/>
+              <p:cNvSpPr txBox="1"/>
+              <p:nvPr/>
+            </p:nvSpPr>
+            <p:spPr>
+              <a:xfrm>
+                <a:off x="2625433" y="1259443"/>
+                <a:ext cx="714375" cy="369332"/>
+              </a:xfrm>
+              <a:prstGeom prst="rect">
+                <a:avLst/>
+              </a:prstGeom>
+              <a:noFill/>
+            </p:spPr>
+            <p:txBody>
+              <a:bodyPr wrap="square" rtlCol="0">
+                <a:spAutoFit/>
+              </a:bodyPr>
+              <a:lstStyle/>
+              <a:p>
+                <a:pPr algn="ctr"/>
+                <a:r>
+                  <a:rPr lang="pl-PL" b="1" dirty="0" smtClean="0"/>
+                  <a:t>SURF</a:t>
+                </a:r>
+                <a:endParaRPr lang="pl-PL" b="1" dirty="0"/>
+              </a:p>
+            </p:txBody>
+          </p:sp>
+          <p:sp>
+            <p:nvSpPr>
+              <p:cNvPr id="53" name="TextBox 52"/>
+              <p:cNvSpPr txBox="1"/>
+              <p:nvPr/>
+            </p:nvSpPr>
+            <p:spPr>
+              <a:xfrm>
+                <a:off x="6097187" y="506879"/>
+                <a:ext cx="2016922" cy="646331"/>
+              </a:xfrm>
+              <a:prstGeom prst="rect">
+                <a:avLst/>
+              </a:prstGeom>
+              <a:noFill/>
+            </p:spPr>
+            <p:txBody>
+              <a:bodyPr wrap="square" rtlCol="0">
+                <a:spAutoFit/>
+              </a:bodyPr>
+              <a:lstStyle/>
+              <a:p>
+                <a:pPr algn="ctr"/>
+                <a:r>
+                  <a:rPr lang="pl-PL" b="1" dirty="0" smtClean="0"/>
+                  <a:t>Wynik algorytmu </a:t>
+                </a:r>
+                <a:br>
+                  <a:rPr lang="pl-PL" b="1" dirty="0" smtClean="0"/>
+                </a:br>
+                <a:r>
+                  <a:rPr lang="pl-PL" b="1" dirty="0" smtClean="0"/>
+                  <a:t>K-średnich</a:t>
+                </a:r>
+                <a:endParaRPr lang="pl-PL" b="1" dirty="0"/>
+              </a:p>
+            </p:txBody>
+          </p:sp>
+          <p:sp>
+            <p:nvSpPr>
+              <p:cNvPr id="54" name="TextBox 53"/>
+              <p:cNvSpPr txBox="1"/>
+              <p:nvPr/>
+            </p:nvSpPr>
+            <p:spPr>
+              <a:xfrm>
+                <a:off x="3639144" y="506879"/>
+                <a:ext cx="1141811" cy="646331"/>
+              </a:xfrm>
+              <a:prstGeom prst="rect">
+                <a:avLst/>
+              </a:prstGeom>
+              <a:noFill/>
+            </p:spPr>
+            <p:txBody>
+              <a:bodyPr wrap="square" rtlCol="0">
+                <a:spAutoFit/>
+              </a:bodyPr>
+              <a:lstStyle/>
+              <a:p>
+                <a:pPr algn="ctr"/>
+                <a:r>
+                  <a:rPr lang="pl-PL" b="1" dirty="0" smtClean="0"/>
+                  <a:t>Punkty </a:t>
+                </a:r>
+                <a:br>
+                  <a:rPr lang="pl-PL" b="1" dirty="0" smtClean="0"/>
+                </a:br>
+                <a:r>
+                  <a:rPr lang="pl-PL" b="1" dirty="0" smtClean="0"/>
+                  <a:t>kluczowe</a:t>
+                </a:r>
+                <a:endParaRPr lang="pl-PL" b="1" dirty="0"/>
+              </a:p>
+            </p:txBody>
+          </p:sp>
+          <p:sp>
+            <p:nvSpPr>
+              <p:cNvPr id="55" name="TextBox 54"/>
+              <p:cNvSpPr txBox="1"/>
+              <p:nvPr/>
+            </p:nvSpPr>
+            <p:spPr>
+              <a:xfrm>
+                <a:off x="6097189" y="6048375"/>
+                <a:ext cx="2016922" cy="369332"/>
+              </a:xfrm>
+              <a:prstGeom prst="rect">
+                <a:avLst/>
+              </a:prstGeom>
+              <a:noFill/>
+            </p:spPr>
+            <p:txBody>
+              <a:bodyPr wrap="square" rtlCol="0">
+                <a:spAutoFit/>
+              </a:bodyPr>
+              <a:lstStyle/>
+              <a:p>
+                <a:pPr algn="ctr"/>
+                <a:r>
+                  <a:rPr lang="pl-PL" b="1" dirty="0" smtClean="0"/>
+                  <a:t>Baza danych</a:t>
+                </a:r>
+                <a:endParaRPr lang="pl-PL" b="1" dirty="0"/>
+              </a:p>
+            </p:txBody>
+          </p:sp>
+          <p:sp>
+            <p:nvSpPr>
+              <p:cNvPr id="47" name="Rectangle 46"/>
+              <p:cNvSpPr/>
+              <p:nvPr/>
+            </p:nvSpPr>
+            <p:spPr>
+              <a:xfrm>
+                <a:off x="2074149" y="5449669"/>
+                <a:ext cx="1190390" cy="646331"/>
+              </a:xfrm>
+              <a:prstGeom prst="rect">
+                <a:avLst/>
+              </a:prstGeom>
+            </p:spPr>
+            <p:txBody>
+              <a:bodyPr wrap="none">
+                <a:spAutoFit/>
+              </a:bodyPr>
+              <a:lstStyle/>
+              <a:p>
+                <a:pPr algn="ctr"/>
+                <a:r>
+                  <a:rPr lang="pl-PL" b="1" dirty="0" smtClean="0"/>
+                  <a:t>Algorytm</a:t>
+                </a:r>
+                <a:br>
+                  <a:rPr lang="pl-PL" b="1" dirty="0" smtClean="0"/>
+                </a:br>
+                <a:r>
+                  <a:rPr lang="pl-PL" b="1" dirty="0" smtClean="0"/>
+                  <a:t>K-średnich</a:t>
+                </a:r>
+                <a:endParaRPr lang="pl-PL" b="1" dirty="0"/>
+              </a:p>
+            </p:txBody>
+          </p:sp>
+        </p:grpSp>
+        <p:sp>
+          <p:nvSpPr>
+            <p:cNvPr id="58" name="TextBox 57"/>
+            <p:cNvSpPr txBox="1"/>
+            <p:nvPr/>
+          </p:nvSpPr>
+          <p:spPr>
+            <a:xfrm>
+              <a:off x="750305" y="573733"/>
+              <a:ext cx="2057400" cy="369332"/>
+            </a:xfrm>
+            <a:prstGeom prst="rect">
+              <a:avLst/>
+            </a:prstGeom>
+            <a:noFill/>
+          </p:spPr>
+          <p:txBody>
+            <a:bodyPr wrap="square" rtlCol="0">
+              <a:spAutoFit/>
+            </a:bodyPr>
+            <a:lstStyle/>
+            <a:p>
+              <a:pPr algn="ctr"/>
+              <a:r>
+                <a:rPr lang="pl-PL" b="1" dirty="0" smtClean="0"/>
+                <a:t>Próbki uczące</a:t>
+              </a:r>
+              <a:endParaRPr lang="pl-PL" b="1" dirty="0"/>
+            </a:p>
+          </p:txBody>
+        </p:sp>
+        <p:sp>
+          <p:nvSpPr>
+            <p:cNvPr id="59" name="TextBox 58"/>
+            <p:cNvSpPr txBox="1"/>
+            <p:nvPr/>
+          </p:nvSpPr>
+          <p:spPr>
+            <a:xfrm>
+              <a:off x="750306" y="3692394"/>
+              <a:ext cx="2057400" cy="646331"/>
+            </a:xfrm>
+            <a:prstGeom prst="rect">
+              <a:avLst/>
+            </a:prstGeom>
+            <a:noFill/>
+          </p:spPr>
+          <p:txBody>
+            <a:bodyPr wrap="square" rtlCol="0">
+              <a:spAutoFit/>
+            </a:bodyPr>
+            <a:lstStyle/>
+            <a:p>
+              <a:pPr algn="ctr"/>
+              <a:r>
+                <a:rPr lang="pl-PL" b="1" dirty="0" smtClean="0"/>
+                <a:t>Próbka </a:t>
+              </a:r>
+              <a:br>
+                <a:rPr lang="pl-PL" b="1" dirty="0" smtClean="0"/>
+              </a:br>
+              <a:r>
+                <a:rPr lang="pl-PL" b="1" dirty="0" smtClean="0"/>
+                <a:t>testowa</a:t>
+              </a:r>
+              <a:endParaRPr lang="pl-PL" b="1" dirty="0"/>
+            </a:p>
+          </p:txBody>
+        </p:sp>
+      </p:grpSp>
     </p:spTree>
   </p:cSld>
   <p:clrMapOvr>

</xml_diff>

<commit_message>
Testowanie + Wnioski początek
</commit_message>
<xml_diff>
--- a/Praca/PrezentacjaZawierajacaObrazyPracy.pptx
+++ b/Praca/PrezentacjaZawierajacaObrazyPracy.pptx
@@ -5,7 +5,7 @@
     <p:sldMasterId id="2147483648" r:id="rId1"/>
   </p:sldMasterIdLst>
   <p:notesMasterIdLst>
-    <p:notesMasterId r:id="rId10"/>
+    <p:notesMasterId r:id="rId12"/>
   </p:notesMasterIdLst>
   <p:sldIdLst>
     <p:sldId id="257" r:id="rId2"/>
@@ -16,6 +16,8 @@
     <p:sldId id="262" r:id="rId7"/>
     <p:sldId id="263" r:id="rId8"/>
     <p:sldId id="264" r:id="rId9"/>
+    <p:sldId id="266" r:id="rId10"/>
+    <p:sldId id="265" r:id="rId11"/>
   </p:sldIdLst>
   <p:sldSz cx="9144000" cy="6858000" type="screen4x3"/>
   <p:notesSz cx="6858000" cy="9144000"/>
@@ -200,7 +202,7 @@
             <a:fld id="{40A17DDC-5670-4824-BB94-70ABD52AAC20}" type="datetimeFigureOut">
               <a:rPr lang="pl-PL" smtClean="0"/>
               <a:pPr/>
-              <a:t>13.06.2018</a:t>
+              <a:t>16.06.2018</a:t>
             </a:fld>
             <a:endParaRPr lang="pl-PL"/>
           </a:p>
@@ -651,7 +653,7 @@
             <a:fld id="{92A549DF-A050-4846-87AC-3D2AE01A0CF2}" type="datetimeFigureOut">
               <a:rPr lang="en-US" smtClean="0"/>
               <a:pPr/>
-              <a:t>6/13/2018</a:t>
+              <a:t>6/16/2018</a:t>
             </a:fld>
             <a:endParaRPr lang="en-US"/>
           </a:p>
@@ -818,7 +820,7 @@
             <a:fld id="{92A549DF-A050-4846-87AC-3D2AE01A0CF2}" type="datetimeFigureOut">
               <a:rPr lang="en-US" smtClean="0"/>
               <a:pPr/>
-              <a:t>6/13/2018</a:t>
+              <a:t>6/16/2018</a:t>
             </a:fld>
             <a:endParaRPr lang="en-US"/>
           </a:p>
@@ -995,7 +997,7 @@
             <a:fld id="{92A549DF-A050-4846-87AC-3D2AE01A0CF2}" type="datetimeFigureOut">
               <a:rPr lang="en-US" smtClean="0"/>
               <a:pPr/>
-              <a:t>6/13/2018</a:t>
+              <a:t>6/16/2018</a:t>
             </a:fld>
             <a:endParaRPr lang="en-US"/>
           </a:p>
@@ -1162,7 +1164,7 @@
             <a:fld id="{92A549DF-A050-4846-87AC-3D2AE01A0CF2}" type="datetimeFigureOut">
               <a:rPr lang="en-US" smtClean="0"/>
               <a:pPr/>
-              <a:t>6/13/2018</a:t>
+              <a:t>6/16/2018</a:t>
             </a:fld>
             <a:endParaRPr lang="en-US"/>
           </a:p>
@@ -1405,7 +1407,7 @@
             <a:fld id="{92A549DF-A050-4846-87AC-3D2AE01A0CF2}" type="datetimeFigureOut">
               <a:rPr lang="en-US" smtClean="0"/>
               <a:pPr/>
-              <a:t>6/13/2018</a:t>
+              <a:t>6/16/2018</a:t>
             </a:fld>
             <a:endParaRPr lang="en-US"/>
           </a:p>
@@ -1690,7 +1692,7 @@
             <a:fld id="{92A549DF-A050-4846-87AC-3D2AE01A0CF2}" type="datetimeFigureOut">
               <a:rPr lang="en-US" smtClean="0"/>
               <a:pPr/>
-              <a:t>6/13/2018</a:t>
+              <a:t>6/16/2018</a:t>
             </a:fld>
             <a:endParaRPr lang="en-US"/>
           </a:p>
@@ -2109,7 +2111,7 @@
             <a:fld id="{92A549DF-A050-4846-87AC-3D2AE01A0CF2}" type="datetimeFigureOut">
               <a:rPr lang="en-US" smtClean="0"/>
               <a:pPr/>
-              <a:t>6/13/2018</a:t>
+              <a:t>6/16/2018</a:t>
             </a:fld>
             <a:endParaRPr lang="en-US"/>
           </a:p>
@@ -2224,7 +2226,7 @@
             <a:fld id="{92A549DF-A050-4846-87AC-3D2AE01A0CF2}" type="datetimeFigureOut">
               <a:rPr lang="en-US" smtClean="0"/>
               <a:pPr/>
-              <a:t>6/13/2018</a:t>
+              <a:t>6/16/2018</a:t>
             </a:fld>
             <a:endParaRPr lang="en-US"/>
           </a:p>
@@ -2316,7 +2318,7 @@
             <a:fld id="{92A549DF-A050-4846-87AC-3D2AE01A0CF2}" type="datetimeFigureOut">
               <a:rPr lang="en-US" smtClean="0"/>
               <a:pPr/>
-              <a:t>6/13/2018</a:t>
+              <a:t>6/16/2018</a:t>
             </a:fld>
             <a:endParaRPr lang="en-US"/>
           </a:p>
@@ -2590,7 +2592,7 @@
             <a:fld id="{92A549DF-A050-4846-87AC-3D2AE01A0CF2}" type="datetimeFigureOut">
               <a:rPr lang="en-US" smtClean="0"/>
               <a:pPr/>
-              <a:t>6/13/2018</a:t>
+              <a:t>6/16/2018</a:t>
             </a:fld>
             <a:endParaRPr lang="en-US"/>
           </a:p>
@@ -2840,7 +2842,7 @@
             <a:fld id="{92A549DF-A050-4846-87AC-3D2AE01A0CF2}" type="datetimeFigureOut">
               <a:rPr lang="en-US" smtClean="0"/>
               <a:pPr/>
-              <a:t>6/13/2018</a:t>
+              <a:t>6/16/2018</a:t>
             </a:fld>
             <a:endParaRPr lang="en-US"/>
           </a:p>
@@ -3050,7 +3052,7 @@
             <a:fld id="{92A549DF-A050-4846-87AC-3D2AE01A0CF2}" type="datetimeFigureOut">
               <a:rPr lang="en-US" smtClean="0"/>
               <a:pPr/>
-              <a:t>6/13/2018</a:t>
+              <a:t>6/16/2018</a:t>
             </a:fld>
             <a:endParaRPr lang="en-US"/>
           </a:p>
@@ -3955,6 +3957,1159 @@
         </p:sp>
       </p:grpSp>
     </p:spTree>
+  </p:cSld>
+  <p:clrMapOvr>
+    <a:masterClrMapping/>
+  </p:clrMapOvr>
+</p:sld>
+</file>
+
+<file path=ppt/slides/slide10.xml><?xml version="1.0" encoding="utf-8"?>
+<p:sld xmlns:a="http://schemas.openxmlformats.org/drawingml/2006/main" xmlns:r="http://schemas.openxmlformats.org/officeDocument/2006/relationships" xmlns:p="http://schemas.openxmlformats.org/presentationml/2006/main">
+  <p:cSld>
+    <p:spTree>
+      <p:nvGrpSpPr>
+        <p:cNvPr id="1" name=""/>
+        <p:cNvGrpSpPr/>
+        <p:nvPr/>
+      </p:nvGrpSpPr>
+      <p:grpSpPr>
+        <a:xfrm>
+          <a:off x="0" y="0"/>
+          <a:ext cx="0" cy="0"/>
+          <a:chOff x="0" y="0"/>
+          <a:chExt cx="0" cy="0"/>
+        </a:xfrm>
+      </p:grpSpPr>
+      <p:grpSp>
+        <p:nvGrpSpPr>
+          <p:cNvPr id="110" name="Group 109"/>
+          <p:cNvGrpSpPr/>
+          <p:nvPr/>
+        </p:nvGrpSpPr>
+        <p:grpSpPr>
+          <a:xfrm>
+            <a:off x="152400" y="1211825"/>
+            <a:ext cx="8823600" cy="5202175"/>
+            <a:chOff x="152400" y="1211825"/>
+            <a:chExt cx="8823600" cy="5202175"/>
+          </a:xfrm>
+        </p:grpSpPr>
+        <p:sp>
+          <p:nvSpPr>
+            <p:cNvPr id="75" name="Shape 154"/>
+            <p:cNvSpPr/>
+            <p:nvPr/>
+          </p:nvSpPr>
+          <p:spPr>
+            <a:xfrm>
+              <a:off x="152400" y="1211825"/>
+              <a:ext cx="2880000" cy="1188000"/>
+            </a:xfrm>
+            <a:prstGeom prst="roundRect">
+              <a:avLst>
+                <a:gd name="adj" fmla="val 16667"/>
+              </a:avLst>
+            </a:prstGeom>
+            <a:solidFill>
+              <a:srgbClr val="B6D7A8"/>
+            </a:solidFill>
+            <a:ln w="38100" cap="flat" cmpd="sng">
+              <a:solidFill>
+                <a:srgbClr val="38761D"/>
+              </a:solidFill>
+              <a:prstDash val="solid"/>
+              <a:round/>
+              <a:headEnd type="none" w="sm" len="sm"/>
+              <a:tailEnd type="none" w="sm" len="sm"/>
+            </a:ln>
+          </p:spPr>
+          <p:txBody>
+            <a:bodyPr spcFirstLastPara="1" wrap="square" lIns="91425" tIns="91425" rIns="91425" bIns="91425" anchor="ctr" anchorCtr="0">
+              <a:noAutofit/>
+            </a:bodyPr>
+            <a:lstStyle/>
+            <a:p>
+              <a:pPr marL="0" lvl="0" indent="0">
+                <a:spcBef>
+                  <a:spcPts val="0"/>
+                </a:spcBef>
+                <a:spcAft>
+                  <a:spcPts val="0"/>
+                </a:spcAft>
+                <a:buNone/>
+              </a:pPr>
+              <a:r>
+                <a:rPr lang="en-US" b="1" dirty="0"/>
+                <a:t>View: </a:t>
+              </a:r>
+              <a:r>
+                <a:rPr lang="en-US" b="1" dirty="0" err="1"/>
+                <a:t>Okno</a:t>
+              </a:r>
+              <a:r>
+                <a:rPr lang="en-US" b="1" dirty="0"/>
+                <a:t> </a:t>
+              </a:r>
+              <a:r>
+                <a:rPr lang="en-US" b="1" dirty="0" err="1"/>
+                <a:t>główne</a:t>
+              </a:r>
+              <a:endParaRPr b="1" dirty="0"/>
+            </a:p>
+            <a:p>
+              <a:pPr marL="457200" lvl="0" indent="-317500" rtl="0">
+                <a:spcBef>
+                  <a:spcPts val="0"/>
+                </a:spcBef>
+                <a:spcAft>
+                  <a:spcPts val="0"/>
+                </a:spcAft>
+                <a:buSzPts val="1400"/>
+                <a:buChar char="●"/>
+              </a:pPr>
+              <a:r>
+                <a:rPr lang="en-US" dirty="0" err="1"/>
+                <a:t>Wybrana</a:t>
+              </a:r>
+              <a:r>
+                <a:rPr lang="en-US" dirty="0"/>
+                <a:t> </a:t>
+              </a:r>
+              <a:r>
+                <a:rPr lang="en-US" dirty="0" err="1"/>
+                <a:t>kamera</a:t>
+              </a:r>
+              <a:endParaRPr dirty="0"/>
+            </a:p>
+            <a:p>
+              <a:pPr marL="457200" lvl="0" indent="-317500" rtl="0">
+                <a:spcBef>
+                  <a:spcPts val="0"/>
+                </a:spcBef>
+                <a:spcAft>
+                  <a:spcPts val="0"/>
+                </a:spcAft>
+                <a:buSzPts val="1400"/>
+                <a:buChar char="●"/>
+              </a:pPr>
+              <a:r>
+                <a:rPr lang="en-US" dirty="0" err="1"/>
+                <a:t>Ramka</a:t>
+              </a:r>
+              <a:r>
+                <a:rPr lang="en-US" dirty="0"/>
+                <a:t> </a:t>
+              </a:r>
+              <a:r>
+                <a:rPr lang="en-US" dirty="0" err="1"/>
+                <a:t>Kamery</a:t>
+              </a:r>
+              <a:endParaRPr dirty="0"/>
+            </a:p>
+            <a:p>
+              <a:pPr marL="457200" lvl="0" indent="-317500" rtl="0">
+                <a:spcBef>
+                  <a:spcPts val="0"/>
+                </a:spcBef>
+                <a:spcAft>
+                  <a:spcPts val="0"/>
+                </a:spcAft>
+                <a:buSzPts val="1400"/>
+                <a:buChar char="●"/>
+              </a:pPr>
+              <a:r>
+                <a:rPr lang="en-US" dirty="0" err="1"/>
+                <a:t>Prostokąt</a:t>
+              </a:r>
+              <a:r>
+                <a:rPr lang="en-US" dirty="0"/>
+                <a:t> </a:t>
+              </a:r>
+              <a:r>
+                <a:rPr lang="en-US" dirty="0" err="1"/>
+                <a:t>otaczający</a:t>
+              </a:r>
+              <a:endParaRPr b="1" dirty="0"/>
+            </a:p>
+          </p:txBody>
+        </p:sp>
+        <p:sp>
+          <p:nvSpPr>
+            <p:cNvPr id="76" name="Shape 155"/>
+            <p:cNvSpPr/>
+            <p:nvPr/>
+          </p:nvSpPr>
+          <p:spPr>
+            <a:xfrm>
+              <a:off x="6096000" y="1223500"/>
+              <a:ext cx="2880000" cy="1188000"/>
+            </a:xfrm>
+            <a:prstGeom prst="roundRect">
+              <a:avLst>
+                <a:gd name="adj" fmla="val 16667"/>
+              </a:avLst>
+            </a:prstGeom>
+            <a:solidFill>
+              <a:srgbClr val="B6D7A8"/>
+            </a:solidFill>
+            <a:ln w="38100" cap="flat" cmpd="sng">
+              <a:solidFill>
+                <a:srgbClr val="38761D"/>
+              </a:solidFill>
+              <a:prstDash val="solid"/>
+              <a:round/>
+              <a:headEnd type="none" w="sm" len="sm"/>
+              <a:tailEnd type="none" w="sm" len="sm"/>
+            </a:ln>
+          </p:spPr>
+          <p:txBody>
+            <a:bodyPr spcFirstLastPara="1" wrap="square" lIns="91425" tIns="91425" rIns="91425" bIns="91425" anchor="ctr" anchorCtr="0">
+              <a:noAutofit/>
+            </a:bodyPr>
+            <a:lstStyle/>
+            <a:p>
+              <a:pPr marL="0" lvl="0" indent="0">
+                <a:spcBef>
+                  <a:spcPts val="0"/>
+                </a:spcBef>
+                <a:spcAft>
+                  <a:spcPts val="0"/>
+                </a:spcAft>
+                <a:buNone/>
+              </a:pPr>
+              <a:r>
+                <a:rPr lang="en-US" b="1" dirty="0">
+                  <a:solidFill>
+                    <a:schemeClr val="dk1"/>
+                  </a:solidFill>
+                </a:rPr>
+                <a:t>View</a:t>
+              </a:r>
+              <a:r>
+                <a:rPr lang="en-US" b="1" dirty="0"/>
+                <a:t>: </a:t>
+              </a:r>
+              <a:r>
+                <a:rPr lang="en-US" b="1" dirty="0" err="1"/>
+                <a:t>Okno</a:t>
+              </a:r>
+              <a:r>
+                <a:rPr lang="en-US" b="1" dirty="0"/>
+                <a:t> </a:t>
+              </a:r>
+              <a:r>
+                <a:rPr lang="en-US" b="1" dirty="0" err="1"/>
+                <a:t>bazy</a:t>
+              </a:r>
+              <a:r>
+                <a:rPr lang="en-US" b="1" dirty="0"/>
+                <a:t> </a:t>
+              </a:r>
+              <a:r>
+                <a:rPr lang="en-US" b="1" dirty="0" err="1"/>
+                <a:t>danych</a:t>
+              </a:r>
+              <a:endParaRPr b="1" dirty="0"/>
+            </a:p>
+            <a:p>
+              <a:pPr marL="457200" lvl="0" indent="-317500" rtl="0">
+                <a:lnSpc>
+                  <a:spcPct val="115000"/>
+                </a:lnSpc>
+                <a:spcBef>
+                  <a:spcPts val="0"/>
+                </a:spcBef>
+                <a:spcAft>
+                  <a:spcPts val="0"/>
+                </a:spcAft>
+                <a:buClr>
+                  <a:schemeClr val="dk1"/>
+                </a:buClr>
+                <a:buSzPts val="1400"/>
+                <a:buChar char="●"/>
+              </a:pPr>
+              <a:r>
+                <a:rPr lang="pl-PL" dirty="0"/>
+                <a:t>O</a:t>
+              </a:r>
+              <a:r>
+                <a:rPr lang="en-US" dirty="0" err="1" smtClean="0"/>
+                <a:t>braz</a:t>
+              </a:r>
+              <a:r>
+                <a:rPr lang="en-US" dirty="0" smtClean="0"/>
+                <a:t> </a:t>
+              </a:r>
+              <a:r>
+                <a:rPr lang="en-US" dirty="0" err="1"/>
+                <a:t>gestu</a:t>
+              </a:r>
+              <a:endParaRPr dirty="0"/>
+            </a:p>
+            <a:p>
+              <a:pPr marL="457200" lvl="0" indent="-317500" rtl="0">
+                <a:lnSpc>
+                  <a:spcPct val="115000"/>
+                </a:lnSpc>
+                <a:spcBef>
+                  <a:spcPts val="0"/>
+                </a:spcBef>
+                <a:spcAft>
+                  <a:spcPts val="0"/>
+                </a:spcAft>
+                <a:buSzPts val="1400"/>
+                <a:buChar char="●"/>
+              </a:pPr>
+              <a:r>
+                <a:rPr lang="en-US" dirty="0" err="1"/>
+                <a:t>Wektor</a:t>
+              </a:r>
+              <a:r>
+                <a:rPr lang="en-US" dirty="0"/>
+                <a:t> </a:t>
+              </a:r>
+              <a:r>
+                <a:rPr lang="en-US" dirty="0" err="1"/>
+                <a:t>cech</a:t>
+              </a:r>
+              <a:r>
+                <a:rPr lang="en-US" dirty="0"/>
+                <a:t> </a:t>
+              </a:r>
+              <a:r>
+                <a:rPr lang="en-US" dirty="0" err="1"/>
+                <a:t>obrazu</a:t>
+              </a:r>
+              <a:endParaRPr dirty="0"/>
+            </a:p>
+          </p:txBody>
+        </p:sp>
+        <p:sp>
+          <p:nvSpPr>
+            <p:cNvPr id="77" name="Shape 156"/>
+            <p:cNvSpPr/>
+            <p:nvPr/>
+          </p:nvSpPr>
+          <p:spPr>
+            <a:xfrm>
+              <a:off x="3124200" y="1211825"/>
+              <a:ext cx="2880000" cy="1188000"/>
+            </a:xfrm>
+            <a:prstGeom prst="roundRect">
+              <a:avLst>
+                <a:gd name="adj" fmla="val 16667"/>
+              </a:avLst>
+            </a:prstGeom>
+            <a:solidFill>
+              <a:srgbClr val="B6D7A8"/>
+            </a:solidFill>
+            <a:ln w="38100" cap="flat" cmpd="sng">
+              <a:solidFill>
+                <a:srgbClr val="38761D"/>
+              </a:solidFill>
+              <a:prstDash val="solid"/>
+              <a:round/>
+              <a:headEnd type="none" w="sm" len="sm"/>
+              <a:tailEnd type="none" w="sm" len="sm"/>
+            </a:ln>
+          </p:spPr>
+          <p:txBody>
+            <a:bodyPr spcFirstLastPara="1" wrap="square" lIns="91425" tIns="91425" rIns="91425" bIns="91425" anchor="ctr" anchorCtr="0">
+              <a:noAutofit/>
+            </a:bodyPr>
+            <a:lstStyle/>
+            <a:p>
+              <a:pPr marL="0" lvl="0" indent="0">
+                <a:spcBef>
+                  <a:spcPts val="0"/>
+                </a:spcBef>
+                <a:spcAft>
+                  <a:spcPts val="0"/>
+                </a:spcAft>
+                <a:buNone/>
+              </a:pPr>
+              <a:r>
+                <a:rPr lang="en-US" b="1" dirty="0">
+                  <a:solidFill>
+                    <a:schemeClr val="dk1"/>
+                  </a:solidFill>
+                </a:rPr>
+                <a:t>View</a:t>
+              </a:r>
+              <a:r>
+                <a:rPr lang="en-US" b="1" dirty="0"/>
+                <a:t>: </a:t>
+              </a:r>
+              <a:r>
+                <a:rPr lang="en-US" b="1" dirty="0" err="1"/>
+                <a:t>Okno</a:t>
+              </a:r>
+              <a:r>
+                <a:rPr lang="en-US" b="1" dirty="0"/>
+                <a:t> </a:t>
+              </a:r>
+              <a:r>
+                <a:rPr lang="en-US" b="1" dirty="0" err="1"/>
+                <a:t>filtrowania</a:t>
+              </a:r>
+              <a:endParaRPr b="1" dirty="0"/>
+            </a:p>
+            <a:p>
+              <a:pPr marL="457200" lvl="0" indent="-317500" rtl="0">
+                <a:spcBef>
+                  <a:spcPts val="0"/>
+                </a:spcBef>
+                <a:spcAft>
+                  <a:spcPts val="0"/>
+                </a:spcAft>
+                <a:buClr>
+                  <a:schemeClr val="dk1"/>
+                </a:buClr>
+                <a:buSzPts val="1400"/>
+                <a:buChar char="●"/>
+              </a:pPr>
+              <a:r>
+                <a:rPr lang="en-US" dirty="0" err="1">
+                  <a:solidFill>
+                    <a:schemeClr val="dk1"/>
+                  </a:solidFill>
+                </a:rPr>
+                <a:t>Filtr</a:t>
+              </a:r>
+              <a:r>
+                <a:rPr lang="en-US" dirty="0">
+                  <a:solidFill>
+                    <a:schemeClr val="dk1"/>
+                  </a:solidFill>
+                </a:rPr>
+                <a:t> HSL</a:t>
+              </a:r>
+              <a:endParaRPr dirty="0">
+                <a:solidFill>
+                  <a:schemeClr val="dk1"/>
+                </a:solidFill>
+              </a:endParaRPr>
+            </a:p>
+            <a:p>
+              <a:pPr marL="457200" lvl="0" indent="-317500" rtl="0">
+                <a:spcBef>
+                  <a:spcPts val="0"/>
+                </a:spcBef>
+                <a:spcAft>
+                  <a:spcPts val="0"/>
+                </a:spcAft>
+                <a:buClr>
+                  <a:schemeClr val="dk1"/>
+                </a:buClr>
+                <a:buSzPts val="1400"/>
+                <a:buChar char="●"/>
+              </a:pPr>
+              <a:r>
+                <a:rPr lang="en-US" dirty="0" err="1">
+                  <a:solidFill>
+                    <a:schemeClr val="dk1"/>
+                  </a:solidFill>
+                </a:rPr>
+                <a:t>Ramka</a:t>
+              </a:r>
+              <a:r>
+                <a:rPr lang="en-US" dirty="0">
+                  <a:solidFill>
+                    <a:schemeClr val="dk1"/>
+                  </a:solidFill>
+                </a:rPr>
+                <a:t> </a:t>
+              </a:r>
+              <a:r>
+                <a:rPr lang="en-US" dirty="0" err="1">
+                  <a:solidFill>
+                    <a:schemeClr val="dk1"/>
+                  </a:solidFill>
+                </a:rPr>
+                <a:t>Kamery</a:t>
+              </a:r>
+              <a:endParaRPr dirty="0">
+                <a:solidFill>
+                  <a:schemeClr val="dk1"/>
+                </a:solidFill>
+              </a:endParaRPr>
+            </a:p>
+            <a:p>
+              <a:pPr marL="457200" lvl="0" indent="-317500" rtl="0">
+                <a:spcBef>
+                  <a:spcPts val="0"/>
+                </a:spcBef>
+                <a:spcAft>
+                  <a:spcPts val="0"/>
+                </a:spcAft>
+                <a:buClr>
+                  <a:schemeClr val="dk1"/>
+                </a:buClr>
+                <a:buSzPts val="1400"/>
+                <a:buChar char="●"/>
+              </a:pPr>
+              <a:r>
+                <a:rPr lang="en-US" dirty="0" err="1">
+                  <a:solidFill>
+                    <a:schemeClr val="dk1"/>
+                  </a:solidFill>
+                </a:rPr>
+                <a:t>Prostokąt</a:t>
+              </a:r>
+              <a:r>
+                <a:rPr lang="en-US" dirty="0">
+                  <a:solidFill>
+                    <a:schemeClr val="dk1"/>
+                  </a:solidFill>
+                </a:rPr>
+                <a:t> </a:t>
+              </a:r>
+              <a:r>
+                <a:rPr lang="en-US" dirty="0" err="1">
+                  <a:solidFill>
+                    <a:schemeClr val="dk1"/>
+                  </a:solidFill>
+                </a:rPr>
+                <a:t>otaczający</a:t>
+              </a:r>
+              <a:endParaRPr dirty="0">
+                <a:solidFill>
+                  <a:schemeClr val="dk1"/>
+                </a:solidFill>
+              </a:endParaRPr>
+            </a:p>
+          </p:txBody>
+        </p:sp>
+        <p:sp>
+          <p:nvSpPr>
+            <p:cNvPr id="78" name="Shape 157"/>
+            <p:cNvSpPr/>
+            <p:nvPr/>
+          </p:nvSpPr>
+          <p:spPr>
+            <a:xfrm>
+              <a:off x="584400" y="3496350"/>
+              <a:ext cx="2016000" cy="628800"/>
+            </a:xfrm>
+            <a:prstGeom prst="roundRect">
+              <a:avLst>
+                <a:gd name="adj" fmla="val 16667"/>
+              </a:avLst>
+            </a:prstGeom>
+            <a:solidFill>
+              <a:srgbClr val="EA9999"/>
+            </a:solidFill>
+            <a:ln w="38100" cap="flat" cmpd="sng">
+              <a:solidFill>
+                <a:srgbClr val="990000"/>
+              </a:solidFill>
+              <a:prstDash val="solid"/>
+              <a:round/>
+              <a:headEnd type="none" w="sm" len="sm"/>
+              <a:tailEnd type="none" w="sm" len="sm"/>
+            </a:ln>
+          </p:spPr>
+          <p:txBody>
+            <a:bodyPr spcFirstLastPara="1" wrap="square" lIns="91425" tIns="91425" rIns="91425" bIns="91425" anchor="ctr" anchorCtr="0">
+              <a:noAutofit/>
+            </a:bodyPr>
+            <a:lstStyle/>
+            <a:p>
+              <a:pPr marL="0" lvl="0" indent="0" algn="ctr" rtl="0">
+                <a:spcBef>
+                  <a:spcPts val="0"/>
+                </a:spcBef>
+                <a:spcAft>
+                  <a:spcPts val="0"/>
+                </a:spcAft>
+                <a:buNone/>
+              </a:pPr>
+              <a:r>
+                <a:rPr lang="en-US" b="1" dirty="0" err="1"/>
+                <a:t>ViewModel</a:t>
+              </a:r>
+              <a:r>
+                <a:rPr lang="en-US" b="1" dirty="0"/>
+                <a:t>: </a:t>
+              </a:r>
+              <a:r>
+                <a:rPr lang="pl-PL" b="1" dirty="0" smtClean="0"/>
+                <a:t/>
+              </a:r>
+              <a:br>
+                <a:rPr lang="pl-PL" b="1" dirty="0" smtClean="0"/>
+              </a:br>
+              <a:r>
+                <a:rPr lang="en-US" b="1" dirty="0" err="1" smtClean="0"/>
+                <a:t>Okno</a:t>
+              </a:r>
+              <a:r>
+                <a:rPr lang="en-US" b="1" dirty="0" smtClean="0"/>
+                <a:t> </a:t>
+              </a:r>
+              <a:r>
+                <a:rPr lang="en-US" b="1" dirty="0" err="1"/>
+                <a:t>główne</a:t>
+              </a:r>
+              <a:endParaRPr b="1" dirty="0"/>
+            </a:p>
+          </p:txBody>
+        </p:sp>
+        <p:sp>
+          <p:nvSpPr>
+            <p:cNvPr id="79" name="Shape 158"/>
+            <p:cNvSpPr/>
+            <p:nvPr/>
+          </p:nvSpPr>
+          <p:spPr>
+            <a:xfrm>
+              <a:off x="6528300" y="3429000"/>
+              <a:ext cx="2015400" cy="763500"/>
+            </a:xfrm>
+            <a:prstGeom prst="roundRect">
+              <a:avLst>
+                <a:gd name="adj" fmla="val 16667"/>
+              </a:avLst>
+            </a:prstGeom>
+            <a:solidFill>
+              <a:srgbClr val="EA9999"/>
+            </a:solidFill>
+            <a:ln w="38100" cap="flat" cmpd="sng">
+              <a:solidFill>
+                <a:srgbClr val="990000"/>
+              </a:solidFill>
+              <a:prstDash val="solid"/>
+              <a:round/>
+              <a:headEnd type="none" w="sm" len="sm"/>
+              <a:tailEnd type="none" w="sm" len="sm"/>
+            </a:ln>
+          </p:spPr>
+          <p:txBody>
+            <a:bodyPr spcFirstLastPara="1" wrap="square" lIns="91425" tIns="91425" rIns="91425" bIns="91425" anchor="ctr" anchorCtr="0">
+              <a:noAutofit/>
+            </a:bodyPr>
+            <a:lstStyle/>
+            <a:p>
+              <a:pPr marL="0" lvl="0" indent="0" algn="ctr" rtl="0">
+                <a:spcBef>
+                  <a:spcPts val="0"/>
+                </a:spcBef>
+                <a:spcAft>
+                  <a:spcPts val="0"/>
+                </a:spcAft>
+                <a:buNone/>
+              </a:pPr>
+              <a:r>
+                <a:rPr lang="en-US" b="1" dirty="0" err="1"/>
+                <a:t>ViewModel</a:t>
+              </a:r>
+              <a:r>
+                <a:rPr lang="en-US" b="1" dirty="0"/>
+                <a:t>: </a:t>
+              </a:r>
+              <a:br>
+                <a:rPr lang="en-US" b="1" dirty="0"/>
+              </a:br>
+              <a:r>
+                <a:rPr lang="en-US" b="1" dirty="0" err="1"/>
+                <a:t>Okno</a:t>
+              </a:r>
+              <a:r>
+                <a:rPr lang="en-US" b="1" dirty="0"/>
+                <a:t> </a:t>
+              </a:r>
+              <a:r>
+                <a:rPr lang="en-US" b="1" dirty="0" err="1"/>
+                <a:t>bazy</a:t>
+              </a:r>
+              <a:r>
+                <a:rPr lang="en-US" b="1" dirty="0"/>
+                <a:t> </a:t>
+              </a:r>
+              <a:r>
+                <a:rPr lang="en-US" b="1" dirty="0" err="1"/>
+                <a:t>danych</a:t>
+              </a:r>
+              <a:endParaRPr b="1" dirty="0"/>
+            </a:p>
+          </p:txBody>
+        </p:sp>
+        <p:sp>
+          <p:nvSpPr>
+            <p:cNvPr id="80" name="Shape 159"/>
+            <p:cNvSpPr/>
+            <p:nvPr/>
+          </p:nvSpPr>
+          <p:spPr>
+            <a:xfrm>
+              <a:off x="3556200" y="3429000"/>
+              <a:ext cx="2016000" cy="763500"/>
+            </a:xfrm>
+            <a:prstGeom prst="roundRect">
+              <a:avLst>
+                <a:gd name="adj" fmla="val 16667"/>
+              </a:avLst>
+            </a:prstGeom>
+            <a:solidFill>
+              <a:srgbClr val="EA9999"/>
+            </a:solidFill>
+            <a:ln w="38100" cap="flat" cmpd="sng">
+              <a:solidFill>
+                <a:srgbClr val="990000"/>
+              </a:solidFill>
+              <a:prstDash val="solid"/>
+              <a:round/>
+              <a:headEnd type="none" w="sm" len="sm"/>
+              <a:tailEnd type="none" w="sm" len="sm"/>
+            </a:ln>
+          </p:spPr>
+          <p:txBody>
+            <a:bodyPr spcFirstLastPara="1" wrap="square" lIns="91425" tIns="91425" rIns="91425" bIns="91425" anchor="ctr" anchorCtr="0">
+              <a:noAutofit/>
+            </a:bodyPr>
+            <a:lstStyle/>
+            <a:p>
+              <a:pPr marL="0" lvl="0" indent="0" algn="ctr" rtl="0">
+                <a:spcBef>
+                  <a:spcPts val="0"/>
+                </a:spcBef>
+                <a:spcAft>
+                  <a:spcPts val="0"/>
+                </a:spcAft>
+                <a:buNone/>
+              </a:pPr>
+              <a:r>
+                <a:rPr lang="en-US" b="1" dirty="0" err="1"/>
+                <a:t>ViewModel</a:t>
+              </a:r>
+              <a:r>
+                <a:rPr lang="en-US" b="1" dirty="0"/>
+                <a:t>: </a:t>
+              </a:r>
+              <a:br>
+                <a:rPr lang="en-US" b="1" dirty="0"/>
+              </a:br>
+              <a:r>
+                <a:rPr lang="en-US" b="1" dirty="0" err="1"/>
+                <a:t>Okno</a:t>
+              </a:r>
+              <a:r>
+                <a:rPr lang="en-US" b="1" dirty="0"/>
+                <a:t> </a:t>
+              </a:r>
+              <a:r>
+                <a:rPr lang="en-US" b="1" dirty="0" err="1"/>
+                <a:t>filtrowania</a:t>
+              </a:r>
+              <a:endParaRPr b="1" dirty="0"/>
+            </a:p>
+          </p:txBody>
+        </p:sp>
+        <p:sp>
+          <p:nvSpPr>
+            <p:cNvPr id="81" name="Shape 160"/>
+            <p:cNvSpPr/>
+            <p:nvPr/>
+          </p:nvSpPr>
+          <p:spPr>
+            <a:xfrm>
+              <a:off x="3670200" y="5334000"/>
+              <a:ext cx="1788000" cy="1080000"/>
+            </a:xfrm>
+            <a:prstGeom prst="roundRect">
+              <a:avLst>
+                <a:gd name="adj" fmla="val 16667"/>
+              </a:avLst>
+            </a:prstGeom>
+            <a:solidFill>
+              <a:srgbClr val="A4C2F4"/>
+            </a:solidFill>
+            <a:ln w="38100" cap="flat" cmpd="sng">
+              <a:solidFill>
+                <a:srgbClr val="1155CC"/>
+              </a:solidFill>
+              <a:prstDash val="solid"/>
+              <a:round/>
+              <a:headEnd type="none" w="sm" len="sm"/>
+              <a:tailEnd type="none" w="sm" len="sm"/>
+            </a:ln>
+          </p:spPr>
+          <p:txBody>
+            <a:bodyPr spcFirstLastPara="1" wrap="square" lIns="91425" tIns="91425" rIns="91425" bIns="91425" anchor="ctr" anchorCtr="0">
+              <a:noAutofit/>
+            </a:bodyPr>
+            <a:lstStyle/>
+            <a:p>
+              <a:pPr marL="0" lvl="0" indent="0">
+                <a:spcBef>
+                  <a:spcPts val="0"/>
+                </a:spcBef>
+                <a:spcAft>
+                  <a:spcPts val="0"/>
+                </a:spcAft>
+                <a:buNone/>
+              </a:pPr>
+              <a:r>
+                <a:rPr lang="en-US" b="1" dirty="0"/>
+                <a:t>Model: </a:t>
+              </a:r>
+              <a:r>
+                <a:rPr lang="en-US" b="1" dirty="0" err="1"/>
+                <a:t>Kamera</a:t>
+              </a:r>
+              <a:endParaRPr b="1" dirty="0"/>
+            </a:p>
+            <a:p>
+              <a:pPr marL="0" lvl="0" indent="0" rtl="0">
+                <a:lnSpc>
+                  <a:spcPct val="115000"/>
+                </a:lnSpc>
+                <a:spcBef>
+                  <a:spcPts val="0"/>
+                </a:spcBef>
+                <a:spcAft>
+                  <a:spcPts val="0"/>
+                </a:spcAft>
+                <a:buClr>
+                  <a:schemeClr val="dk1"/>
+                </a:buClr>
+                <a:buSzPts val="1100"/>
+                <a:buFont typeface="Arial"/>
+                <a:buNone/>
+              </a:pPr>
+              <a:r>
+                <a:rPr lang="en-US" dirty="0">
+                  <a:solidFill>
+                    <a:schemeClr val="dk1"/>
+                  </a:solidFill>
+                </a:rPr>
+                <a:t>•</a:t>
+              </a:r>
+              <a:r>
+                <a:rPr lang="en-US" dirty="0" err="1">
+                  <a:solidFill>
+                    <a:schemeClr val="dk1"/>
+                  </a:solidFill>
+                </a:rPr>
+                <a:t>Nazwa</a:t>
+              </a:r>
+              <a:endParaRPr dirty="0">
+                <a:solidFill>
+                  <a:schemeClr val="dk1"/>
+                </a:solidFill>
+              </a:endParaRPr>
+            </a:p>
+            <a:p>
+              <a:pPr marL="0" lvl="0" indent="0" rtl="0">
+                <a:lnSpc>
+                  <a:spcPct val="115000"/>
+                </a:lnSpc>
+                <a:spcBef>
+                  <a:spcPts val="0"/>
+                </a:spcBef>
+                <a:spcAft>
+                  <a:spcPts val="0"/>
+                </a:spcAft>
+                <a:buNone/>
+              </a:pPr>
+              <a:r>
+                <a:rPr lang="en-US" dirty="0">
+                  <a:solidFill>
+                    <a:schemeClr val="dk1"/>
+                  </a:solidFill>
+                </a:rPr>
+                <a:t>•</a:t>
+              </a:r>
+              <a:r>
+                <a:rPr lang="en-US" dirty="0" err="1">
+                  <a:solidFill>
+                    <a:schemeClr val="dk1"/>
+                  </a:solidFill>
+                </a:rPr>
+                <a:t>Ramka</a:t>
+              </a:r>
+              <a:endParaRPr b="1" dirty="0"/>
+            </a:p>
+          </p:txBody>
+        </p:sp>
+        <p:cxnSp>
+          <p:nvCxnSpPr>
+            <p:cNvPr id="82" name="Shape 161"/>
+            <p:cNvCxnSpPr>
+              <a:stCxn id="81" idx="0"/>
+              <a:endCxn id="78" idx="3"/>
+            </p:cNvCxnSpPr>
+            <p:nvPr/>
+          </p:nvCxnSpPr>
+          <p:spPr>
+            <a:xfrm flipH="1" flipV="1">
+              <a:off x="2600400" y="3810750"/>
+              <a:ext cx="1963800" cy="1523250"/>
+            </a:xfrm>
+            <a:prstGeom prst="straightConnector1">
+              <a:avLst/>
+            </a:prstGeom>
+            <a:noFill/>
+            <a:ln w="38100" cap="flat" cmpd="sng">
+              <a:solidFill>
+                <a:schemeClr val="dk2"/>
+              </a:solidFill>
+              <a:prstDash val="solid"/>
+              <a:round/>
+              <a:headEnd type="none" w="med" len="med"/>
+              <a:tailEnd type="triangle" w="med" len="med"/>
+            </a:ln>
+          </p:spPr>
+        </p:cxnSp>
+        <p:cxnSp>
+          <p:nvCxnSpPr>
+            <p:cNvPr id="83" name="Shape 162"/>
+            <p:cNvCxnSpPr>
+              <a:stCxn id="81" idx="0"/>
+              <a:endCxn id="80" idx="2"/>
+            </p:cNvCxnSpPr>
+            <p:nvPr/>
+          </p:nvCxnSpPr>
+          <p:spPr>
+            <a:xfrm flipV="1">
+              <a:off x="4564200" y="4192500"/>
+              <a:ext cx="0" cy="1141500"/>
+            </a:xfrm>
+            <a:prstGeom prst="straightConnector1">
+              <a:avLst/>
+            </a:prstGeom>
+            <a:noFill/>
+            <a:ln w="38100" cap="flat" cmpd="sng">
+              <a:solidFill>
+                <a:schemeClr val="dk2"/>
+              </a:solidFill>
+              <a:prstDash val="solid"/>
+              <a:round/>
+              <a:headEnd type="none" w="med" len="med"/>
+              <a:tailEnd type="triangle" w="med" len="med"/>
+            </a:ln>
+          </p:spPr>
+        </p:cxnSp>
+        <p:cxnSp>
+          <p:nvCxnSpPr>
+            <p:cNvPr id="84" name="Shape 163"/>
+            <p:cNvCxnSpPr>
+              <a:stCxn id="78" idx="2"/>
+              <a:endCxn id="81" idx="1"/>
+            </p:cNvCxnSpPr>
+            <p:nvPr/>
+          </p:nvCxnSpPr>
+          <p:spPr>
+            <a:xfrm>
+              <a:off x="1592400" y="4125150"/>
+              <a:ext cx="2077800" cy="1748850"/>
+            </a:xfrm>
+            <a:prstGeom prst="straightConnector1">
+              <a:avLst/>
+            </a:prstGeom>
+            <a:noFill/>
+            <a:ln w="38100" cap="flat" cmpd="sng">
+              <a:solidFill>
+                <a:schemeClr val="dk2"/>
+              </a:solidFill>
+              <a:prstDash val="solid"/>
+              <a:round/>
+              <a:headEnd type="none" w="med" len="med"/>
+              <a:tailEnd type="triangle" w="med" len="med"/>
+            </a:ln>
+          </p:spPr>
+        </p:cxnSp>
+        <p:cxnSp>
+          <p:nvCxnSpPr>
+            <p:cNvPr id="85" name="Shape 164"/>
+            <p:cNvCxnSpPr>
+              <a:stCxn id="75" idx="2"/>
+              <a:endCxn id="78" idx="0"/>
+            </p:cNvCxnSpPr>
+            <p:nvPr/>
+          </p:nvCxnSpPr>
+          <p:spPr>
+            <a:xfrm>
+              <a:off x="1592400" y="2399825"/>
+              <a:ext cx="0" cy="1096525"/>
+            </a:xfrm>
+            <a:prstGeom prst="straightConnector1">
+              <a:avLst/>
+            </a:prstGeom>
+            <a:noFill/>
+            <a:ln w="38100" cap="flat" cmpd="sng">
+              <a:solidFill>
+                <a:schemeClr val="dk2"/>
+              </a:solidFill>
+              <a:prstDash val="solid"/>
+              <a:round/>
+              <a:headEnd type="none" w="med" len="med"/>
+              <a:tailEnd type="triangle" w="med" len="med"/>
+            </a:ln>
+          </p:spPr>
+        </p:cxnSp>
+        <p:cxnSp>
+          <p:nvCxnSpPr>
+            <p:cNvPr id="86" name="Shape 165"/>
+            <p:cNvCxnSpPr>
+              <a:stCxn id="77" idx="2"/>
+              <a:endCxn id="80" idx="0"/>
+            </p:cNvCxnSpPr>
+            <p:nvPr/>
+          </p:nvCxnSpPr>
+          <p:spPr>
+            <a:xfrm>
+              <a:off x="4564200" y="2399825"/>
+              <a:ext cx="0" cy="1029175"/>
+            </a:xfrm>
+            <a:prstGeom prst="straightConnector1">
+              <a:avLst/>
+            </a:prstGeom>
+            <a:noFill/>
+            <a:ln w="38100" cap="flat" cmpd="sng">
+              <a:solidFill>
+                <a:schemeClr val="dk2"/>
+              </a:solidFill>
+              <a:prstDash val="solid"/>
+              <a:round/>
+              <a:headEnd type="none" w="med" len="med"/>
+              <a:tailEnd type="triangle" w="med" len="med"/>
+            </a:ln>
+          </p:spPr>
+        </p:cxnSp>
+        <p:cxnSp>
+          <p:nvCxnSpPr>
+            <p:cNvPr id="87" name="Shape 166"/>
+            <p:cNvCxnSpPr>
+              <a:stCxn id="76" idx="2"/>
+              <a:endCxn id="79" idx="0"/>
+            </p:cNvCxnSpPr>
+            <p:nvPr/>
+          </p:nvCxnSpPr>
+          <p:spPr>
+            <a:xfrm>
+              <a:off x="7536000" y="2411500"/>
+              <a:ext cx="0" cy="1017500"/>
+            </a:xfrm>
+            <a:prstGeom prst="straightConnector1">
+              <a:avLst/>
+            </a:prstGeom>
+            <a:noFill/>
+            <a:ln w="38100" cap="flat" cmpd="sng">
+              <a:solidFill>
+                <a:schemeClr val="dk2"/>
+              </a:solidFill>
+              <a:prstDash val="solid"/>
+              <a:round/>
+              <a:headEnd type="none" w="med" len="med"/>
+              <a:tailEnd type="triangle" w="med" len="med"/>
+            </a:ln>
+          </p:spPr>
+        </p:cxnSp>
+        <p:sp>
+          <p:nvSpPr>
+            <p:cNvPr id="108" name="Lightning Bolt 107"/>
+            <p:cNvSpPr/>
+            <p:nvPr/>
+          </p:nvSpPr>
+          <p:spPr>
+            <a:xfrm>
+              <a:off x="3581400" y="4466175"/>
+              <a:ext cx="297000" cy="533400"/>
+            </a:xfrm>
+            <a:prstGeom prst="lightningBolt">
+              <a:avLst/>
+            </a:prstGeom>
+            <a:solidFill>
+              <a:srgbClr val="FFFF00"/>
+            </a:solidFill>
+            <a:ln>
+              <a:solidFill>
+                <a:srgbClr val="C00000"/>
+              </a:solidFill>
+            </a:ln>
+          </p:spPr>
+          <p:style>
+            <a:lnRef idx="2">
+              <a:schemeClr val="accent1">
+                <a:shade val="50000"/>
+              </a:schemeClr>
+            </a:lnRef>
+            <a:fillRef idx="1">
+              <a:schemeClr val="accent1"/>
+            </a:fillRef>
+            <a:effectRef idx="0">
+              <a:schemeClr val="accent1"/>
+            </a:effectRef>
+            <a:fontRef idx="minor">
+              <a:schemeClr val="lt1"/>
+            </a:fontRef>
+          </p:style>
+          <p:txBody>
+            <a:bodyPr rtlCol="0" anchor="ctr"/>
+            <a:lstStyle/>
+            <a:p>
+              <a:pPr algn="ctr"/>
+              <a:endParaRPr lang="pl-PL"/>
+            </a:p>
+          </p:txBody>
+        </p:sp>
+        <p:sp>
+          <p:nvSpPr>
+            <p:cNvPr id="109" name="Lightning Bolt 108"/>
+            <p:cNvSpPr/>
+            <p:nvPr/>
+          </p:nvSpPr>
+          <p:spPr>
+            <a:xfrm>
+              <a:off x="4415700" y="4466175"/>
+              <a:ext cx="297000" cy="533400"/>
+            </a:xfrm>
+            <a:prstGeom prst="lightningBolt">
+              <a:avLst/>
+            </a:prstGeom>
+            <a:solidFill>
+              <a:srgbClr val="FFFF00"/>
+            </a:solidFill>
+            <a:ln>
+              <a:solidFill>
+                <a:srgbClr val="C00000"/>
+              </a:solidFill>
+            </a:ln>
+          </p:spPr>
+          <p:style>
+            <a:lnRef idx="2">
+              <a:schemeClr val="accent1">
+                <a:shade val="50000"/>
+              </a:schemeClr>
+            </a:lnRef>
+            <a:fillRef idx="1">
+              <a:schemeClr val="accent1"/>
+            </a:fillRef>
+            <a:effectRef idx="0">
+              <a:schemeClr val="accent1"/>
+            </a:effectRef>
+            <a:fontRef idx="minor">
+              <a:schemeClr val="lt1"/>
+            </a:fontRef>
+          </p:style>
+          <p:txBody>
+            <a:bodyPr rtlCol="0" anchor="ctr"/>
+            <a:lstStyle/>
+            <a:p>
+              <a:pPr algn="ctr"/>
+              <a:endParaRPr lang="pl-PL"/>
+            </a:p>
+          </p:txBody>
+        </p:sp>
+      </p:grpSp>
+    </p:spTree>
+    <p:extLst>
+      <p:ext uri="{BB962C8B-B14F-4D97-AF65-F5344CB8AC3E}">
+        <p14:creationId xmlns:p14="http://schemas.microsoft.com/office/powerpoint/2010/main" val="671893581"/>
+      </p:ext>
+    </p:extLst>
   </p:cSld>
   <p:clrMapOvr>
     <a:masterClrMapping/>
@@ -33403,6 +34558,66 @@
 </p:sld>
 </file>
 
+<file path=ppt/slides/slide9.xml><?xml version="1.0" encoding="utf-8"?>
+<p:sld xmlns:a="http://schemas.openxmlformats.org/drawingml/2006/main" xmlns:r="http://schemas.openxmlformats.org/officeDocument/2006/relationships" xmlns:p="http://schemas.openxmlformats.org/presentationml/2006/main">
+  <p:cSld>
+    <p:spTree>
+      <p:nvGrpSpPr>
+        <p:cNvPr id="1" name=""/>
+        <p:cNvGrpSpPr/>
+        <p:nvPr/>
+      </p:nvGrpSpPr>
+      <p:grpSpPr>
+        <a:xfrm>
+          <a:off x="0" y="0"/>
+          <a:ext cx="0" cy="0"/>
+          <a:chOff x="0" y="0"/>
+          <a:chExt cx="0" cy="0"/>
+        </a:xfrm>
+      </p:grpSpPr>
+      <p:pic>
+        <p:nvPicPr>
+          <p:cNvPr id="15" name="Picture 14"/>
+          <p:cNvPicPr>
+            <a:picLocks noChangeAspect="1"/>
+          </p:cNvPicPr>
+          <p:nvPr/>
+        </p:nvPicPr>
+        <p:blipFill>
+          <a:blip r:embed="rId2">
+            <a:extLst>
+              <a:ext uri="{28A0092B-C50C-407E-A947-70E740481C1C}">
+                <a14:useLocalDpi xmlns:a14="http://schemas.microsoft.com/office/drawing/2010/main" val="0"/>
+              </a:ext>
+            </a:extLst>
+          </a:blip>
+          <a:stretch>
+            <a:fillRect/>
+          </a:stretch>
+        </p:blipFill>
+        <p:spPr>
+          <a:xfrm>
+            <a:off x="152765" y="780507"/>
+            <a:ext cx="8838470" cy="5296986"/>
+          </a:xfrm>
+          <a:prstGeom prst="rect">
+            <a:avLst/>
+          </a:prstGeom>
+        </p:spPr>
+      </p:pic>
+    </p:spTree>
+    <p:extLst>
+      <p:ext uri="{BB962C8B-B14F-4D97-AF65-F5344CB8AC3E}">
+        <p14:creationId xmlns:p14="http://schemas.microsoft.com/office/powerpoint/2010/main" val="1614022121"/>
+      </p:ext>
+    </p:extLst>
+  </p:cSld>
+  <p:clrMapOvr>
+    <a:masterClrMapping/>
+  </p:clrMapOvr>
+</p:sld>
+</file>
+
 <file path=ppt/theme/theme1.xml><?xml version="1.0" encoding="utf-8"?>
 <a:theme xmlns:a="http://schemas.openxmlformats.org/drawingml/2006/main" name="Office Theme">
   <a:themeElements>

</xml_diff>